<commit_message>
included figures for publication
</commit_message>
<xml_diff>
--- a/Figures/illustration/20210905_Sketches_XY-20210905-01.pptx
+++ b/Figures/illustration/20210905_Sketches_XY-20210905-01.pptx
@@ -264,7 +264,7 @@
           <a:p>
             <a:fld id="{78744B2C-11EF-4E1F-92A7-D04115CBF0C2}" type="datetimeFigureOut">
               <a:rPr lang="en-CA" smtClean="0"/>
-              <a:t>2021-11-19</a:t>
+              <a:t>2021-12-20</a:t>
             </a:fld>
             <a:endParaRPr lang="en-CA"/>
           </a:p>
@@ -464,7 +464,7 @@
           <a:p>
             <a:fld id="{78744B2C-11EF-4E1F-92A7-D04115CBF0C2}" type="datetimeFigureOut">
               <a:rPr lang="en-CA" smtClean="0"/>
-              <a:t>2021-11-19</a:t>
+              <a:t>2021-12-20</a:t>
             </a:fld>
             <a:endParaRPr lang="en-CA"/>
           </a:p>
@@ -674,7 +674,7 @@
           <a:p>
             <a:fld id="{78744B2C-11EF-4E1F-92A7-D04115CBF0C2}" type="datetimeFigureOut">
               <a:rPr lang="en-CA" smtClean="0"/>
-              <a:t>2021-11-19</a:t>
+              <a:t>2021-12-20</a:t>
             </a:fld>
             <a:endParaRPr lang="en-CA"/>
           </a:p>
@@ -874,7 +874,7 @@
           <a:p>
             <a:fld id="{78744B2C-11EF-4E1F-92A7-D04115CBF0C2}" type="datetimeFigureOut">
               <a:rPr lang="en-CA" smtClean="0"/>
-              <a:t>2021-11-19</a:t>
+              <a:t>2021-12-20</a:t>
             </a:fld>
             <a:endParaRPr lang="en-CA"/>
           </a:p>
@@ -1150,7 +1150,7 @@
           <a:p>
             <a:fld id="{78744B2C-11EF-4E1F-92A7-D04115CBF0C2}" type="datetimeFigureOut">
               <a:rPr lang="en-CA" smtClean="0"/>
-              <a:t>2021-11-19</a:t>
+              <a:t>2021-12-20</a:t>
             </a:fld>
             <a:endParaRPr lang="en-CA"/>
           </a:p>
@@ -1418,7 +1418,7 @@
           <a:p>
             <a:fld id="{78744B2C-11EF-4E1F-92A7-D04115CBF0C2}" type="datetimeFigureOut">
               <a:rPr lang="en-CA" smtClean="0"/>
-              <a:t>2021-11-19</a:t>
+              <a:t>2021-12-20</a:t>
             </a:fld>
             <a:endParaRPr lang="en-CA"/>
           </a:p>
@@ -1833,7 +1833,7 @@
           <a:p>
             <a:fld id="{78744B2C-11EF-4E1F-92A7-D04115CBF0C2}" type="datetimeFigureOut">
               <a:rPr lang="en-CA" smtClean="0"/>
-              <a:t>2021-11-19</a:t>
+              <a:t>2021-12-20</a:t>
             </a:fld>
             <a:endParaRPr lang="en-CA"/>
           </a:p>
@@ -1975,7 +1975,7 @@
           <a:p>
             <a:fld id="{78744B2C-11EF-4E1F-92A7-D04115CBF0C2}" type="datetimeFigureOut">
               <a:rPr lang="en-CA" smtClean="0"/>
-              <a:t>2021-11-19</a:t>
+              <a:t>2021-12-20</a:t>
             </a:fld>
             <a:endParaRPr lang="en-CA"/>
           </a:p>
@@ -2088,7 +2088,7 @@
           <a:p>
             <a:fld id="{78744B2C-11EF-4E1F-92A7-D04115CBF0C2}" type="datetimeFigureOut">
               <a:rPr lang="en-CA" smtClean="0"/>
-              <a:t>2021-11-19</a:t>
+              <a:t>2021-12-20</a:t>
             </a:fld>
             <a:endParaRPr lang="en-CA"/>
           </a:p>
@@ -2401,7 +2401,7 @@
           <a:p>
             <a:fld id="{78744B2C-11EF-4E1F-92A7-D04115CBF0C2}" type="datetimeFigureOut">
               <a:rPr lang="en-CA" smtClean="0"/>
-              <a:t>2021-11-19</a:t>
+              <a:t>2021-12-20</a:t>
             </a:fld>
             <a:endParaRPr lang="en-CA"/>
           </a:p>
@@ -2690,7 +2690,7 @@
           <a:p>
             <a:fld id="{78744B2C-11EF-4E1F-92A7-D04115CBF0C2}" type="datetimeFigureOut">
               <a:rPr lang="en-CA" smtClean="0"/>
-              <a:t>2021-11-19</a:t>
+              <a:t>2021-12-20</a:t>
             </a:fld>
             <a:endParaRPr lang="en-CA"/>
           </a:p>
@@ -2933,7 +2933,7 @@
           <a:p>
             <a:fld id="{78744B2C-11EF-4E1F-92A7-D04115CBF0C2}" type="datetimeFigureOut">
               <a:rPr lang="en-CA" smtClean="0"/>
-              <a:t>2021-11-19</a:t>
+              <a:t>2021-12-20</a:t>
             </a:fld>
             <a:endParaRPr lang="en-CA"/>
           </a:p>
@@ -3352,10 +3352,10 @@
       </p:grpSpPr>
       <p:grpSp>
         <p:nvGrpSpPr>
-          <p:cNvPr id="2" name="Group 1">
+          <p:cNvPr id="3" name="Group 2">
             <a:extLst>
               <a:ext uri="{FF2B5EF4-FFF2-40B4-BE49-F238E27FC236}">
-                <a16:creationId xmlns:a16="http://schemas.microsoft.com/office/drawing/2014/main" id="{31D4E5CD-1AF0-41C8-8E9E-1256C502103E}"/>
+                <a16:creationId xmlns:a16="http://schemas.microsoft.com/office/drawing/2014/main" id="{40D286AC-0DC3-F940-8CA9-07ED4270BAFD}"/>
               </a:ext>
             </a:extLst>
           </p:cNvPr>
@@ -3364,241 +3364,12 @@
         </p:nvGrpSpPr>
         <p:grpSpPr>
           <a:xfrm>
-            <a:off x="4294705" y="1723862"/>
-            <a:ext cx="4053510" cy="3427850"/>
-            <a:chOff x="3868824" y="1601156"/>
-            <a:chExt cx="4053510" cy="3427850"/>
+            <a:off x="4384849" y="1723862"/>
+            <a:ext cx="3963366" cy="3339795"/>
+            <a:chOff x="4384849" y="1723862"/>
+            <a:chExt cx="3963366" cy="3339795"/>
           </a:xfrm>
         </p:grpSpPr>
-        <p:cxnSp>
-          <p:nvCxnSpPr>
-            <p:cNvPr id="20" name="Straight Connector 19">
-              <a:extLst>
-                <a:ext uri="{FF2B5EF4-FFF2-40B4-BE49-F238E27FC236}">
-                  <a16:creationId xmlns:a16="http://schemas.microsoft.com/office/drawing/2014/main" id="{4D1C2114-87B4-43E7-81C6-BA869E5FD9AB}"/>
-                </a:ext>
-              </a:extLst>
-            </p:cNvPr>
-            <p:cNvCxnSpPr>
-              <a:cxnSpLocks/>
-            </p:cNvCxnSpPr>
-            <p:nvPr/>
-          </p:nvCxnSpPr>
-          <p:spPr>
-            <a:xfrm>
-              <a:off x="6338813" y="4170021"/>
-              <a:ext cx="332492" cy="275690"/>
-            </a:xfrm>
-            <a:prstGeom prst="line">
-              <a:avLst/>
-            </a:prstGeom>
-            <a:ln w="203200">
-              <a:solidFill>
-                <a:schemeClr val="bg2">
-                  <a:lumMod val="75000"/>
-                </a:schemeClr>
-              </a:solidFill>
-            </a:ln>
-          </p:spPr>
-          <p:style>
-            <a:lnRef idx="1">
-              <a:schemeClr val="accent1"/>
-            </a:lnRef>
-            <a:fillRef idx="0">
-              <a:schemeClr val="accent1"/>
-            </a:fillRef>
-            <a:effectRef idx="0">
-              <a:schemeClr val="accent1"/>
-            </a:effectRef>
-            <a:fontRef idx="minor">
-              <a:schemeClr val="tx1"/>
-            </a:fontRef>
-          </p:style>
-        </p:cxnSp>
-        <p:sp>
-          <p:nvSpPr>
-            <p:cNvPr id="25" name="Freeform: Shape 24">
-              <a:extLst>
-                <a:ext uri="{FF2B5EF4-FFF2-40B4-BE49-F238E27FC236}">
-                  <a16:creationId xmlns:a16="http://schemas.microsoft.com/office/drawing/2014/main" id="{60469F79-E126-4491-9E2E-A8F6F7E3F6BC}"/>
-                </a:ext>
-              </a:extLst>
-            </p:cNvPr>
-            <p:cNvSpPr/>
-            <p:nvPr/>
-          </p:nvSpPr>
-          <p:spPr>
-            <a:xfrm>
-              <a:off x="6647387" y="4255386"/>
-              <a:ext cx="914400" cy="324665"/>
-            </a:xfrm>
-            <a:custGeom>
-              <a:avLst/>
-              <a:gdLst>
-                <a:gd name="connsiteX0" fmla="*/ 0 w 914400"/>
-                <a:gd name="connsiteY0" fmla="*/ 160020 h 324665"/>
-                <a:gd name="connsiteX1" fmla="*/ 502920 w 914400"/>
-                <a:gd name="connsiteY1" fmla="*/ 320040 h 324665"/>
-                <a:gd name="connsiteX2" fmla="*/ 914400 w 914400"/>
-                <a:gd name="connsiteY2" fmla="*/ 0 h 324665"/>
-              </a:gdLst>
-              <a:ahLst/>
-              <a:cxnLst>
-                <a:cxn ang="0">
-                  <a:pos x="connsiteX0" y="connsiteY0"/>
-                </a:cxn>
-                <a:cxn ang="0">
-                  <a:pos x="connsiteX1" y="connsiteY1"/>
-                </a:cxn>
-                <a:cxn ang="0">
-                  <a:pos x="connsiteX2" y="connsiteY2"/>
-                </a:cxn>
-              </a:cxnLst>
-              <a:rect l="l" t="t" r="r" b="b"/>
-              <a:pathLst>
-                <a:path w="914400" h="324665">
-                  <a:moveTo>
-                    <a:pt x="0" y="160020"/>
-                  </a:moveTo>
-                  <a:cubicBezTo>
-                    <a:pt x="175260" y="253365"/>
-                    <a:pt x="350520" y="346710"/>
-                    <a:pt x="502920" y="320040"/>
-                  </a:cubicBezTo>
-                  <a:cubicBezTo>
-                    <a:pt x="655320" y="293370"/>
-                    <a:pt x="784860" y="146685"/>
-                    <a:pt x="914400" y="0"/>
-                  </a:cubicBezTo>
-                </a:path>
-              </a:pathLst>
-            </a:custGeom>
-            <a:noFill/>
-            <a:ln w="203200">
-              <a:solidFill>
-                <a:schemeClr val="bg2">
-                  <a:lumMod val="75000"/>
-                </a:schemeClr>
-              </a:solidFill>
-            </a:ln>
-          </p:spPr>
-          <p:style>
-            <a:lnRef idx="2">
-              <a:schemeClr val="accent1">
-                <a:shade val="50000"/>
-              </a:schemeClr>
-            </a:lnRef>
-            <a:fillRef idx="1">
-              <a:schemeClr val="accent1"/>
-            </a:fillRef>
-            <a:effectRef idx="0">
-              <a:schemeClr val="accent1"/>
-            </a:effectRef>
-            <a:fontRef idx="minor">
-              <a:schemeClr val="lt1"/>
-            </a:fontRef>
-          </p:style>
-          <p:txBody>
-            <a:bodyPr rtlCol="0" anchor="ctr"/>
-            <a:lstStyle/>
-            <a:p>
-              <a:pPr algn="ctr"/>
-              <a:endParaRPr lang="en-CA"/>
-            </a:p>
-          </p:txBody>
-        </p:sp>
-        <p:sp>
-          <p:nvSpPr>
-            <p:cNvPr id="26" name="Freeform: Shape 25">
-              <a:extLst>
-                <a:ext uri="{FF2B5EF4-FFF2-40B4-BE49-F238E27FC236}">
-                  <a16:creationId xmlns:a16="http://schemas.microsoft.com/office/drawing/2014/main" id="{FDC7A091-4713-4432-A312-C3D87E4087C6}"/>
-                </a:ext>
-              </a:extLst>
-            </p:cNvPr>
-            <p:cNvSpPr/>
-            <p:nvPr/>
-          </p:nvSpPr>
-          <p:spPr>
-            <a:xfrm>
-              <a:off x="7538332" y="3687909"/>
-              <a:ext cx="223846" cy="568768"/>
-            </a:xfrm>
-            <a:custGeom>
-              <a:avLst/>
-              <a:gdLst>
-                <a:gd name="connsiteX0" fmla="*/ 0 w 274320"/>
-                <a:gd name="connsiteY0" fmla="*/ 617220 h 617220"/>
-                <a:gd name="connsiteX1" fmla="*/ 182880 w 274320"/>
-                <a:gd name="connsiteY1" fmla="*/ 320040 h 617220"/>
-                <a:gd name="connsiteX2" fmla="*/ 274320 w 274320"/>
-                <a:gd name="connsiteY2" fmla="*/ 0 h 617220"/>
-              </a:gdLst>
-              <a:ahLst/>
-              <a:cxnLst>
-                <a:cxn ang="0">
-                  <a:pos x="connsiteX0" y="connsiteY0"/>
-                </a:cxn>
-                <a:cxn ang="0">
-                  <a:pos x="connsiteX1" y="connsiteY1"/>
-                </a:cxn>
-                <a:cxn ang="0">
-                  <a:pos x="connsiteX2" y="connsiteY2"/>
-                </a:cxn>
-              </a:cxnLst>
-              <a:rect l="l" t="t" r="r" b="b"/>
-              <a:pathLst>
-                <a:path w="274320" h="617220">
-                  <a:moveTo>
-                    <a:pt x="0" y="617220"/>
-                  </a:moveTo>
-                  <a:cubicBezTo>
-                    <a:pt x="68580" y="520065"/>
-                    <a:pt x="137160" y="422910"/>
-                    <a:pt x="182880" y="320040"/>
-                  </a:cubicBezTo>
-                  <a:cubicBezTo>
-                    <a:pt x="228600" y="217170"/>
-                    <a:pt x="251460" y="108585"/>
-                    <a:pt x="274320" y="0"/>
-                  </a:cubicBezTo>
-                </a:path>
-              </a:pathLst>
-            </a:custGeom>
-            <a:noFill/>
-            <a:ln w="203200">
-              <a:solidFill>
-                <a:schemeClr val="bg2">
-                  <a:lumMod val="75000"/>
-                </a:schemeClr>
-              </a:solidFill>
-            </a:ln>
-          </p:spPr>
-          <p:style>
-            <a:lnRef idx="2">
-              <a:schemeClr val="accent1">
-                <a:shade val="50000"/>
-              </a:schemeClr>
-            </a:lnRef>
-            <a:fillRef idx="1">
-              <a:schemeClr val="accent1"/>
-            </a:fillRef>
-            <a:effectRef idx="0">
-              <a:schemeClr val="accent1"/>
-            </a:effectRef>
-            <a:fontRef idx="minor">
-              <a:schemeClr val="lt1"/>
-            </a:fontRef>
-          </p:style>
-          <p:txBody>
-            <a:bodyPr rtlCol="0" anchor="ctr"/>
-            <a:lstStyle/>
-            <a:p>
-              <a:pPr algn="ctr"/>
-              <a:endParaRPr lang="en-CA"/>
-            </a:p>
-          </p:txBody>
-        </p:sp>
         <p:sp>
           <p:nvSpPr>
             <p:cNvPr id="4" name="Oval 3">
@@ -3613,7 +3384,7 @@
           </p:nvSpPr>
           <p:spPr>
             <a:xfrm rot="19950599">
-              <a:off x="5619019" y="1961076"/>
+              <a:off x="6031558" y="2043254"/>
               <a:ext cx="2104572" cy="2946400"/>
             </a:xfrm>
             <a:prstGeom prst="ellipse">
@@ -3652,7 +3423,7 @@
             <a:lstStyle/>
             <a:p>
               <a:pPr algn="ctr"/>
-              <a:endParaRPr lang="en-CA"/>
+              <a:endParaRPr lang="en-CA" dirty="0"/>
             </a:p>
           </p:txBody>
         </p:sp>
@@ -3670,7 +3441,7 @@
           </p:nvSpPr>
           <p:spPr>
             <a:xfrm rot="19950599">
-              <a:off x="6296560" y="2113437"/>
+              <a:off x="6722441" y="2236143"/>
               <a:ext cx="1574777" cy="2171337"/>
             </a:xfrm>
             <a:prstGeom prst="ellipse">
@@ -3726,7 +3497,7 @@
           </p:nvSpPr>
           <p:spPr>
             <a:xfrm rot="19950599">
-              <a:off x="6907373" y="2376963"/>
+              <a:off x="7333254" y="2499669"/>
               <a:ext cx="1014961" cy="1323886"/>
             </a:xfrm>
             <a:prstGeom prst="ellipse">
@@ -3811,7 +3582,7 @@
           </p:nvSpPr>
           <p:spPr>
             <a:xfrm rot="19464236">
-              <a:off x="5954784" y="3759109"/>
+              <a:off x="6380665" y="3881815"/>
               <a:ext cx="410873" cy="517809"/>
             </a:xfrm>
             <a:prstGeom prst="ellipse">
@@ -3863,7 +3634,7 @@
           </p:nvSpPr>
           <p:spPr>
             <a:xfrm rot="312357">
-              <a:off x="5613825" y="2503578"/>
+              <a:off x="6039706" y="2626284"/>
               <a:ext cx="319038" cy="536718"/>
             </a:xfrm>
             <a:prstGeom prst="ellipse">
@@ -3942,7 +3713,7 @@
           </p:nvSpPr>
           <p:spPr>
             <a:xfrm rot="18829783">
-              <a:off x="5454879" y="2296243"/>
+              <a:off x="5880760" y="2418949"/>
               <a:ext cx="176269" cy="2226386"/>
             </a:xfrm>
             <a:prstGeom prst="rect">
@@ -4005,237 +3776,6 @@
         </p:sp>
         <p:sp>
           <p:nvSpPr>
-            <p:cNvPr id="41" name="Rectangle: Rounded Corners 40">
-              <a:extLst>
-                <a:ext uri="{FF2B5EF4-FFF2-40B4-BE49-F238E27FC236}">
-                  <a16:creationId xmlns:a16="http://schemas.microsoft.com/office/drawing/2014/main" id="{16A5F3F4-1B46-468B-9A23-E1E8CA10AC8A}"/>
-                </a:ext>
-              </a:extLst>
-            </p:cNvPr>
-            <p:cNvSpPr/>
-            <p:nvPr/>
-          </p:nvSpPr>
-          <p:spPr>
-            <a:xfrm rot="2695155" flipH="1">
-              <a:off x="4929969" y="2784852"/>
-              <a:ext cx="116117" cy="192416"/>
-            </a:xfrm>
-            <a:prstGeom prst="roundRect">
-              <a:avLst/>
-            </a:prstGeom>
-            <a:gradFill>
-              <a:gsLst>
-                <a:gs pos="0">
-                  <a:schemeClr val="accent1">
-                    <a:lumMod val="5000"/>
-                    <a:lumOff val="95000"/>
-                  </a:schemeClr>
-                </a:gs>
-                <a:gs pos="100000">
-                  <a:schemeClr val="bg2">
-                    <a:lumMod val="50000"/>
-                  </a:schemeClr>
-                </a:gs>
-                <a:gs pos="82000">
-                  <a:schemeClr val="bg1">
-                    <a:lumMod val="65000"/>
-                  </a:schemeClr>
-                </a:gs>
-                <a:gs pos="54000">
-                  <a:schemeClr val="bg1">
-                    <a:lumMod val="85000"/>
-                  </a:schemeClr>
-                </a:gs>
-              </a:gsLst>
-              <a:path path="circle">
-                <a:fillToRect l="100000" t="100000"/>
-              </a:path>
-            </a:gradFill>
-            <a:ln>
-              <a:noFill/>
-            </a:ln>
-          </p:spPr>
-          <p:style>
-            <a:lnRef idx="2">
-              <a:schemeClr val="accent1">
-                <a:shade val="50000"/>
-              </a:schemeClr>
-            </a:lnRef>
-            <a:fillRef idx="1">
-              <a:schemeClr val="accent1"/>
-            </a:fillRef>
-            <a:effectRef idx="0">
-              <a:schemeClr val="accent1"/>
-            </a:effectRef>
-            <a:fontRef idx="minor">
-              <a:schemeClr val="lt1"/>
-            </a:fontRef>
-          </p:style>
-          <p:txBody>
-            <a:bodyPr rtlCol="0" anchor="ctr"/>
-            <a:lstStyle/>
-            <a:p>
-              <a:pPr algn="ctr"/>
-              <a:endParaRPr lang="en-CA"/>
-            </a:p>
-          </p:txBody>
-        </p:sp>
-        <p:sp>
-          <p:nvSpPr>
-            <p:cNvPr id="43" name="Rectangle: Rounded Corners 42">
-              <a:extLst>
-                <a:ext uri="{FF2B5EF4-FFF2-40B4-BE49-F238E27FC236}">
-                  <a16:creationId xmlns:a16="http://schemas.microsoft.com/office/drawing/2014/main" id="{3CD2DAF6-C768-4EBA-AC3F-42440B8B07D1}"/>
-                </a:ext>
-              </a:extLst>
-            </p:cNvPr>
-            <p:cNvSpPr/>
-            <p:nvPr/>
-          </p:nvSpPr>
-          <p:spPr>
-            <a:xfrm rot="2695155" flipH="1">
-              <a:off x="5095457" y="2940724"/>
-              <a:ext cx="116117" cy="192416"/>
-            </a:xfrm>
-            <a:prstGeom prst="roundRect">
-              <a:avLst/>
-            </a:prstGeom>
-            <a:gradFill>
-              <a:gsLst>
-                <a:gs pos="0">
-                  <a:schemeClr val="accent1">
-                    <a:lumMod val="5000"/>
-                    <a:lumOff val="95000"/>
-                  </a:schemeClr>
-                </a:gs>
-                <a:gs pos="100000">
-                  <a:schemeClr val="bg2">
-                    <a:lumMod val="50000"/>
-                  </a:schemeClr>
-                </a:gs>
-                <a:gs pos="82000">
-                  <a:schemeClr val="bg1">
-                    <a:lumMod val="65000"/>
-                  </a:schemeClr>
-                </a:gs>
-                <a:gs pos="54000">
-                  <a:schemeClr val="bg1">
-                    <a:lumMod val="85000"/>
-                  </a:schemeClr>
-                </a:gs>
-              </a:gsLst>
-              <a:path path="circle">
-                <a:fillToRect l="100000" t="100000"/>
-              </a:path>
-            </a:gradFill>
-            <a:ln>
-              <a:noFill/>
-            </a:ln>
-          </p:spPr>
-          <p:style>
-            <a:lnRef idx="2">
-              <a:schemeClr val="accent1">
-                <a:shade val="50000"/>
-              </a:schemeClr>
-            </a:lnRef>
-            <a:fillRef idx="1">
-              <a:schemeClr val="accent1"/>
-            </a:fillRef>
-            <a:effectRef idx="0">
-              <a:schemeClr val="accent1"/>
-            </a:effectRef>
-            <a:fontRef idx="minor">
-              <a:schemeClr val="lt1"/>
-            </a:fontRef>
-          </p:style>
-          <p:txBody>
-            <a:bodyPr rtlCol="0" anchor="ctr"/>
-            <a:lstStyle/>
-            <a:p>
-              <a:pPr algn="ctr"/>
-              <a:endParaRPr lang="en-CA"/>
-            </a:p>
-          </p:txBody>
-        </p:sp>
-        <p:sp>
-          <p:nvSpPr>
-            <p:cNvPr id="44" name="Rectangle: Rounded Corners 43">
-              <a:extLst>
-                <a:ext uri="{FF2B5EF4-FFF2-40B4-BE49-F238E27FC236}">
-                  <a16:creationId xmlns:a16="http://schemas.microsoft.com/office/drawing/2014/main" id="{A0963151-A730-4675-BD6A-019F03EEB380}"/>
-                </a:ext>
-              </a:extLst>
-            </p:cNvPr>
-            <p:cNvSpPr/>
-            <p:nvPr/>
-          </p:nvSpPr>
-          <p:spPr>
-            <a:xfrm rot="2695155" flipH="1">
-              <a:off x="5246355" y="3090605"/>
-              <a:ext cx="116117" cy="192416"/>
-            </a:xfrm>
-            <a:prstGeom prst="roundRect">
-              <a:avLst/>
-            </a:prstGeom>
-            <a:gradFill>
-              <a:gsLst>
-                <a:gs pos="0">
-                  <a:schemeClr val="accent1">
-                    <a:lumMod val="5000"/>
-                    <a:lumOff val="95000"/>
-                  </a:schemeClr>
-                </a:gs>
-                <a:gs pos="100000">
-                  <a:schemeClr val="bg2">
-                    <a:lumMod val="50000"/>
-                  </a:schemeClr>
-                </a:gs>
-                <a:gs pos="82000">
-                  <a:schemeClr val="bg1">
-                    <a:lumMod val="65000"/>
-                  </a:schemeClr>
-                </a:gs>
-                <a:gs pos="54000">
-                  <a:schemeClr val="bg1">
-                    <a:lumMod val="85000"/>
-                  </a:schemeClr>
-                </a:gs>
-              </a:gsLst>
-              <a:path path="circle">
-                <a:fillToRect l="100000" t="100000"/>
-              </a:path>
-            </a:gradFill>
-            <a:ln>
-              <a:noFill/>
-            </a:ln>
-          </p:spPr>
-          <p:style>
-            <a:lnRef idx="2">
-              <a:schemeClr val="accent1">
-                <a:shade val="50000"/>
-              </a:schemeClr>
-            </a:lnRef>
-            <a:fillRef idx="1">
-              <a:schemeClr val="accent1"/>
-            </a:fillRef>
-            <a:effectRef idx="0">
-              <a:schemeClr val="accent1"/>
-            </a:effectRef>
-            <a:fontRef idx="minor">
-              <a:schemeClr val="lt1"/>
-            </a:fontRef>
-          </p:style>
-          <p:txBody>
-            <a:bodyPr rtlCol="0" anchor="ctr"/>
-            <a:lstStyle/>
-            <a:p>
-              <a:pPr algn="ctr"/>
-              <a:endParaRPr lang="en-CA"/>
-            </a:p>
-          </p:txBody>
-        </p:sp>
-        <p:sp>
-          <p:nvSpPr>
             <p:cNvPr id="45" name="Rectangle: Rounded Corners 44">
               <a:extLst>
                 <a:ext uri="{FF2B5EF4-FFF2-40B4-BE49-F238E27FC236}">
@@ -4248,7 +3788,7 @@
           </p:nvSpPr>
           <p:spPr>
             <a:xfrm rot="2695155" flipH="1">
-              <a:off x="5705308" y="3530354"/>
+              <a:off x="5470009" y="3007676"/>
               <a:ext cx="157935" cy="85636"/>
             </a:xfrm>
             <a:prstGeom prst="roundRect">
@@ -4321,7 +3861,7 @@
           </p:nvSpPr>
           <p:spPr>
             <a:xfrm rot="2695155" flipH="1">
-              <a:off x="5930057" y="3747164"/>
+              <a:off x="5657090" y="3192119"/>
               <a:ext cx="157935" cy="85636"/>
             </a:xfrm>
             <a:prstGeom prst="roundRect">
@@ -4394,7 +3934,7 @@
           </p:nvSpPr>
           <p:spPr>
             <a:xfrm rot="2695155" flipH="1">
-              <a:off x="6159091" y="3965344"/>
+              <a:off x="5826444" y="3347969"/>
               <a:ext cx="157935" cy="85636"/>
             </a:xfrm>
             <a:prstGeom prst="roundRect">
@@ -4453,350 +3993,6 @@
             </a:p>
           </p:txBody>
         </p:sp>
-        <p:grpSp>
-          <p:nvGrpSpPr>
-            <p:cNvPr id="51" name="Group 50">
-              <a:extLst>
-                <a:ext uri="{FF2B5EF4-FFF2-40B4-BE49-F238E27FC236}">
-                  <a16:creationId xmlns:a16="http://schemas.microsoft.com/office/drawing/2014/main" id="{D95314EE-6FE5-423F-A13B-E65BE3FD40C6}"/>
-                </a:ext>
-              </a:extLst>
-            </p:cNvPr>
-            <p:cNvGrpSpPr/>
-            <p:nvPr/>
-          </p:nvGrpSpPr>
-          <p:grpSpPr>
-            <a:xfrm>
-              <a:off x="4519087" y="2491845"/>
-              <a:ext cx="406329" cy="241842"/>
-              <a:chOff x="5471532" y="2491845"/>
-              <a:chExt cx="406329" cy="241842"/>
-            </a:xfrm>
-          </p:grpSpPr>
-          <p:sp>
-            <p:nvSpPr>
-              <p:cNvPr id="49" name="Rectangle: Rounded Corners 48">
-                <a:extLst>
-                  <a:ext uri="{FF2B5EF4-FFF2-40B4-BE49-F238E27FC236}">
-                    <a16:creationId xmlns:a16="http://schemas.microsoft.com/office/drawing/2014/main" id="{6CF14E20-6911-479C-B01F-FD627A459D0C}"/>
-                  </a:ext>
-                </a:extLst>
-              </p:cNvPr>
-              <p:cNvSpPr/>
-              <p:nvPr/>
-            </p:nvSpPr>
-            <p:spPr>
-              <a:xfrm rot="2695155" flipH="1">
-                <a:off x="5471532" y="2491845"/>
-                <a:ext cx="327882" cy="192416"/>
-              </a:xfrm>
-              <a:prstGeom prst="roundRect">
-                <a:avLst/>
-              </a:prstGeom>
-              <a:gradFill flip="none" rotWithShape="1">
-                <a:gsLst>
-                  <a:gs pos="100000">
-                    <a:schemeClr val="bg2">
-                      <a:lumMod val="50000"/>
-                    </a:schemeClr>
-                  </a:gs>
-                  <a:gs pos="0">
-                    <a:srgbClr val="8E8C8C"/>
-                  </a:gs>
-                  <a:gs pos="82000">
-                    <a:schemeClr val="bg1">
-                      <a:lumMod val="65000"/>
-                    </a:schemeClr>
-                  </a:gs>
-                  <a:gs pos="25000">
-                    <a:srgbClr val="C5C5C5"/>
-                  </a:gs>
-                  <a:gs pos="45000">
-                    <a:schemeClr val="bg1">
-                      <a:lumMod val="95000"/>
-                    </a:schemeClr>
-                  </a:gs>
-                </a:gsLst>
-                <a:lin ang="5400000" scaled="0"/>
-                <a:tileRect/>
-              </a:gradFill>
-              <a:ln>
-                <a:noFill/>
-              </a:ln>
-            </p:spPr>
-            <p:style>
-              <a:lnRef idx="2">
-                <a:schemeClr val="accent1">
-                  <a:shade val="50000"/>
-                </a:schemeClr>
-              </a:lnRef>
-              <a:fillRef idx="1">
-                <a:schemeClr val="accent1"/>
-              </a:fillRef>
-              <a:effectRef idx="0">
-                <a:schemeClr val="accent1"/>
-              </a:effectRef>
-              <a:fontRef idx="minor">
-                <a:schemeClr val="lt1"/>
-              </a:fontRef>
-            </p:style>
-            <p:txBody>
-              <a:bodyPr rtlCol="0" anchor="ctr"/>
-              <a:lstStyle/>
-              <a:p>
-                <a:pPr algn="ctr"/>
-                <a:endParaRPr lang="en-CA"/>
-              </a:p>
-            </p:txBody>
-          </p:sp>
-          <p:sp>
-            <p:nvSpPr>
-              <p:cNvPr id="50" name="Flowchart: Manual Operation 49">
-                <a:extLst>
-                  <a:ext uri="{FF2B5EF4-FFF2-40B4-BE49-F238E27FC236}">
-                    <a16:creationId xmlns:a16="http://schemas.microsoft.com/office/drawing/2014/main" id="{C1EAE238-1698-400D-B56A-C444CDC15307}"/>
-                  </a:ext>
-                </a:extLst>
-              </p:cNvPr>
-              <p:cNvSpPr/>
-              <p:nvPr/>
-            </p:nvSpPr>
-            <p:spPr>
-              <a:xfrm rot="8107936">
-                <a:off x="5569014" y="2612690"/>
-                <a:ext cx="308847" cy="120997"/>
-              </a:xfrm>
-              <a:prstGeom prst="flowChartManualOperation">
-                <a:avLst/>
-              </a:prstGeom>
-              <a:gradFill>
-                <a:gsLst>
-                  <a:gs pos="100000">
-                    <a:schemeClr val="bg2">
-                      <a:lumMod val="50000"/>
-                    </a:schemeClr>
-                  </a:gs>
-                  <a:gs pos="0">
-                    <a:srgbClr val="8E8C8C"/>
-                  </a:gs>
-                  <a:gs pos="82000">
-                    <a:schemeClr val="bg1">
-                      <a:lumMod val="65000"/>
-                    </a:schemeClr>
-                  </a:gs>
-                  <a:gs pos="25000">
-                    <a:srgbClr val="C5C5C5"/>
-                  </a:gs>
-                  <a:gs pos="45000">
-                    <a:schemeClr val="bg1">
-                      <a:lumMod val="95000"/>
-                    </a:schemeClr>
-                  </a:gs>
-                </a:gsLst>
-                <a:lin ang="0" scaled="0"/>
-              </a:gradFill>
-              <a:ln>
-                <a:noFill/>
-              </a:ln>
-            </p:spPr>
-            <p:style>
-              <a:lnRef idx="2">
-                <a:schemeClr val="accent1">
-                  <a:shade val="50000"/>
-                </a:schemeClr>
-              </a:lnRef>
-              <a:fillRef idx="1">
-                <a:schemeClr val="accent1"/>
-              </a:fillRef>
-              <a:effectRef idx="0">
-                <a:schemeClr val="accent1"/>
-              </a:effectRef>
-              <a:fontRef idx="minor">
-                <a:schemeClr val="lt1"/>
-              </a:fontRef>
-            </p:style>
-            <p:txBody>
-              <a:bodyPr rtlCol="0" anchor="ctr"/>
-              <a:lstStyle/>
-              <a:p>
-                <a:pPr algn="ctr"/>
-                <a:endParaRPr lang="en-CA"/>
-              </a:p>
-            </p:txBody>
-          </p:sp>
-        </p:grpSp>
-        <p:sp>
-          <p:nvSpPr>
-            <p:cNvPr id="54" name="TextBox 53">
-              <a:extLst>
-                <a:ext uri="{FF2B5EF4-FFF2-40B4-BE49-F238E27FC236}">
-                  <a16:creationId xmlns:a16="http://schemas.microsoft.com/office/drawing/2014/main" id="{06B4704A-05A9-497F-9170-14B3CC7D4326}"/>
-                </a:ext>
-              </a:extLst>
-            </p:cNvPr>
-            <p:cNvSpPr txBox="1"/>
-            <p:nvPr/>
-          </p:nvSpPr>
-          <p:spPr>
-            <a:xfrm>
-              <a:off x="3868824" y="3322569"/>
-              <a:ext cx="1626010" cy="338554"/>
-            </a:xfrm>
-            <a:prstGeom prst="rect">
-              <a:avLst/>
-            </a:prstGeom>
-            <a:noFill/>
-          </p:spPr>
-          <p:txBody>
-            <a:bodyPr wrap="square" rtlCol="0">
-              <a:spAutoFit/>
-            </a:bodyPr>
-            <a:lstStyle/>
-            <a:p>
-              <a:r>
-                <a:rPr lang="en-CA" sz="1600" b="1" dirty="0">
-                  <a:latin typeface="Arial" panose="020B0604020202020204" pitchFamily="34" charset="0"/>
-                  <a:cs typeface="Arial" panose="020B0604020202020204" pitchFamily="34" charset="0"/>
-                </a:rPr>
-                <a:t>Three bands</a:t>
-              </a:r>
-            </a:p>
-          </p:txBody>
-        </p:sp>
-        <p:cxnSp>
-          <p:nvCxnSpPr>
-            <p:cNvPr id="56" name="Straight Arrow Connector 55">
-              <a:extLst>
-                <a:ext uri="{FF2B5EF4-FFF2-40B4-BE49-F238E27FC236}">
-                  <a16:creationId xmlns:a16="http://schemas.microsoft.com/office/drawing/2014/main" id="{0B774A0D-E6C5-4836-9406-0C9E236128AD}"/>
-                </a:ext>
-              </a:extLst>
-            </p:cNvPr>
-            <p:cNvCxnSpPr>
-              <a:cxnSpLocks/>
-              <a:endCxn id="41" idx="2"/>
-            </p:cNvCxnSpPr>
-            <p:nvPr/>
-          </p:nvCxnSpPr>
-          <p:spPr>
-            <a:xfrm flipV="1">
-              <a:off x="4546823" y="2949185"/>
-              <a:ext cx="373271" cy="367296"/>
-            </a:xfrm>
-            <a:prstGeom prst="straightConnector1">
-              <a:avLst/>
-            </a:prstGeom>
-            <a:ln w="28575">
-              <a:solidFill>
-                <a:schemeClr val="tx1"/>
-              </a:solidFill>
-              <a:tailEnd type="triangle" w="med" len="lg"/>
-            </a:ln>
-          </p:spPr>
-          <p:style>
-            <a:lnRef idx="1">
-              <a:schemeClr val="accent1"/>
-            </a:lnRef>
-            <a:fillRef idx="0">
-              <a:schemeClr val="accent1"/>
-            </a:fillRef>
-            <a:effectRef idx="0">
-              <a:schemeClr val="accent1"/>
-            </a:effectRef>
-            <a:fontRef idx="minor">
-              <a:schemeClr val="tx1"/>
-            </a:fontRef>
-          </p:style>
-        </p:cxnSp>
-        <p:cxnSp>
-          <p:nvCxnSpPr>
-            <p:cNvPr id="63" name="Straight Arrow Connector 62">
-              <a:extLst>
-                <a:ext uri="{FF2B5EF4-FFF2-40B4-BE49-F238E27FC236}">
-                  <a16:creationId xmlns:a16="http://schemas.microsoft.com/office/drawing/2014/main" id="{18083AB4-3C4F-41A2-B62B-83EB908F509B}"/>
-                </a:ext>
-              </a:extLst>
-            </p:cNvPr>
-            <p:cNvCxnSpPr>
-              <a:cxnSpLocks/>
-              <a:endCxn id="43" idx="2"/>
-            </p:cNvCxnSpPr>
-            <p:nvPr/>
-          </p:nvCxnSpPr>
-          <p:spPr>
-            <a:xfrm flipV="1">
-              <a:off x="4546823" y="3105057"/>
-              <a:ext cx="538759" cy="211424"/>
-            </a:xfrm>
-            <a:prstGeom prst="straightConnector1">
-              <a:avLst/>
-            </a:prstGeom>
-            <a:ln w="28575">
-              <a:solidFill>
-                <a:schemeClr val="tx1"/>
-              </a:solidFill>
-              <a:tailEnd type="triangle" w="med" len="lg"/>
-            </a:ln>
-          </p:spPr>
-          <p:style>
-            <a:lnRef idx="1">
-              <a:schemeClr val="accent1"/>
-            </a:lnRef>
-            <a:fillRef idx="0">
-              <a:schemeClr val="accent1"/>
-            </a:fillRef>
-            <a:effectRef idx="0">
-              <a:schemeClr val="accent1"/>
-            </a:effectRef>
-            <a:fontRef idx="minor">
-              <a:schemeClr val="tx1"/>
-            </a:fontRef>
-          </p:style>
-        </p:cxnSp>
-        <p:cxnSp>
-          <p:nvCxnSpPr>
-            <p:cNvPr id="65" name="Straight Arrow Connector 64">
-              <a:extLst>
-                <a:ext uri="{FF2B5EF4-FFF2-40B4-BE49-F238E27FC236}">
-                  <a16:creationId xmlns:a16="http://schemas.microsoft.com/office/drawing/2014/main" id="{7D78224D-EBC4-489A-8B3B-8D523E66400D}"/>
-                </a:ext>
-              </a:extLst>
-            </p:cNvPr>
-            <p:cNvCxnSpPr>
-              <a:cxnSpLocks/>
-            </p:cNvCxnSpPr>
-            <p:nvPr/>
-          </p:nvCxnSpPr>
-          <p:spPr>
-            <a:xfrm flipV="1">
-              <a:off x="4548997" y="3249087"/>
-              <a:ext cx="689657" cy="67394"/>
-            </a:xfrm>
-            <a:prstGeom prst="straightConnector1">
-              <a:avLst/>
-            </a:prstGeom>
-            <a:ln w="28575">
-              <a:solidFill>
-                <a:schemeClr val="tx1"/>
-              </a:solidFill>
-              <a:tailEnd type="triangle" w="med" len="lg"/>
-            </a:ln>
-          </p:spPr>
-          <p:style>
-            <a:lnRef idx="1">
-              <a:schemeClr val="accent1"/>
-            </a:lnRef>
-            <a:fillRef idx="0">
-              <a:schemeClr val="accent1"/>
-            </a:fillRef>
-            <a:effectRef idx="0">
-              <a:schemeClr val="accent1"/>
-            </a:effectRef>
-            <a:fontRef idx="minor">
-              <a:schemeClr val="tx1"/>
-            </a:fontRef>
-          </p:style>
-        </p:cxnSp>
         <p:cxnSp>
           <p:nvCxnSpPr>
             <p:cNvPr id="73" name="Straight Arrow Connector 72">
@@ -4808,13 +4004,12 @@
             </p:cNvPr>
             <p:cNvCxnSpPr>
               <a:cxnSpLocks/>
-              <a:endCxn id="47" idx="2"/>
             </p:cNvCxnSpPr>
             <p:nvPr/>
           </p:nvCxnSpPr>
           <p:spPr>
             <a:xfrm flipV="1">
-              <a:off x="5371197" y="3820301"/>
+              <a:off x="5131672" y="3287077"/>
               <a:ext cx="607593" cy="81889"/>
             </a:xfrm>
             <a:prstGeom prst="straightConnector1">
@@ -4856,7 +4051,7 @@
           </p:nvSpPr>
           <p:spPr>
             <a:xfrm>
-              <a:off x="4573420" y="3956885"/>
+              <a:off x="4496507" y="3337054"/>
               <a:ext cx="1289977" cy="338554"/>
             </a:xfrm>
             <a:prstGeom prst="rect">
@@ -4897,7 +4092,7 @@
           </p:nvCxnSpPr>
           <p:spPr>
             <a:xfrm flipV="1">
-              <a:off x="5376795" y="3603491"/>
+              <a:off x="5141496" y="3080813"/>
               <a:ext cx="377246" cy="298699"/>
             </a:xfrm>
             <a:prstGeom prst="straightConnector1">
@@ -4939,7 +4134,7 @@
           </p:nvSpPr>
           <p:spPr>
             <a:xfrm>
-              <a:off x="3958968" y="2002366"/>
+              <a:off x="4384849" y="2125072"/>
               <a:ext cx="2171003" cy="338554"/>
             </a:xfrm>
             <a:prstGeom prst="rect">
@@ -4979,7 +4174,7 @@
           </p:nvCxnSpPr>
           <p:spPr>
             <a:xfrm flipV="1">
-              <a:off x="5997663" y="4243922"/>
+              <a:off x="6423544" y="4366628"/>
               <a:ext cx="159632" cy="376760"/>
             </a:xfrm>
             <a:prstGeom prst="straightConnector1">
@@ -5021,7 +4216,7 @@
           </p:nvSpPr>
           <p:spPr>
             <a:xfrm>
-              <a:off x="5142913" y="4690452"/>
+              <a:off x="6189611" y="4725103"/>
               <a:ext cx="1709500" cy="338554"/>
             </a:xfrm>
             <a:prstGeom prst="rect">
@@ -5040,7 +4235,7 @@
                   <a:latin typeface="Arial" panose="020B0604020202020204" pitchFamily="34" charset="0"/>
                   <a:cs typeface="Arial" panose="020B0604020202020204" pitchFamily="34" charset="0"/>
                 </a:rPr>
-                <a:t>Round window</a:t>
+                <a:t>RWN</a:t>
               </a:r>
             </a:p>
           </p:txBody>
@@ -5059,7 +4254,7 @@
           </p:nvSpPr>
           <p:spPr>
             <a:xfrm>
-              <a:off x="6202209" y="1601156"/>
+              <a:off x="6628090" y="1723862"/>
               <a:ext cx="1399334" cy="369332"/>
             </a:xfrm>
             <a:prstGeom prst="rect">
@@ -5128,10 +4323,10 @@
         </p:nvGrpSpPr>
         <p:grpSpPr>
           <a:xfrm>
-            <a:off x="4772130" y="1789645"/>
-            <a:ext cx="3426293" cy="3240537"/>
-            <a:chOff x="5016107" y="1789645"/>
-            <a:chExt cx="3426293" cy="3240537"/>
+            <a:off x="4775010" y="1789645"/>
+            <a:ext cx="3423413" cy="3240537"/>
+            <a:chOff x="5018987" y="1789645"/>
+            <a:chExt cx="3423413" cy="3240537"/>
           </a:xfrm>
         </p:grpSpPr>
         <p:cxnSp>
@@ -6186,8 +5381,8 @@
           </p:nvSpPr>
           <p:spPr>
             <a:xfrm>
-              <a:off x="5016107" y="4286208"/>
-              <a:ext cx="1757359" cy="338554"/>
+              <a:off x="5018987" y="4241655"/>
+              <a:ext cx="1757359" cy="307777"/>
             </a:xfrm>
             <a:prstGeom prst="rect">
               <a:avLst/>
@@ -6201,12 +5396,23 @@
             <a:lstStyle/>
             <a:p>
               <a:r>
-                <a:rPr lang="en-CA" sz="1600" b="1" dirty="0">
+                <a:rPr lang="en-CA" sz="1400" b="1" dirty="0">
                   <a:latin typeface="Arial" panose="020B0604020202020204" pitchFamily="34" charset="0"/>
                   <a:cs typeface="Arial" panose="020B0604020202020204" pitchFamily="34" charset="0"/>
                 </a:rPr>
-                <a:t>Three bands</a:t>
+                <a:t>Three </a:t>
               </a:r>
+              <a:r>
+                <a:rPr lang="en-US" altLang="zh-CN" sz="1400" b="1" dirty="0">
+                  <a:latin typeface="Arial" panose="020B0604020202020204" pitchFamily="34" charset="0"/>
+                  <a:cs typeface="Arial" panose="020B0604020202020204" pitchFamily="34" charset="0"/>
+                </a:rPr>
+                <a:t>markers</a:t>
+              </a:r>
+              <a:endParaRPr lang="en-CA" sz="1400" b="1" dirty="0">
+                <a:latin typeface="Arial" panose="020B0604020202020204" pitchFamily="34" charset="0"/>
+                <a:cs typeface="Arial" panose="020B0604020202020204" pitchFamily="34" charset="0"/>
+              </a:endParaRPr>
             </a:p>
           </p:txBody>
         </p:sp>
@@ -6359,7 +5565,7 @@
           <p:spPr>
             <a:xfrm>
               <a:off x="6930940" y="1789645"/>
-              <a:ext cx="1511460" cy="338554"/>
+              <a:ext cx="1511460" cy="307777"/>
             </a:xfrm>
             <a:prstGeom prst="rect">
               <a:avLst/>
@@ -6373,7 +5579,7 @@
             <a:lstStyle/>
             <a:p>
               <a:r>
-                <a:rPr lang="en-CA" sz="1600" b="1" dirty="0">
+                <a:rPr lang="en-CA" sz="1400" b="1" dirty="0">
                   <a:latin typeface="Arial" panose="020B0604020202020204" pitchFamily="34" charset="0"/>
                   <a:cs typeface="Arial" panose="020B0604020202020204" pitchFamily="34" charset="0"/>
                 </a:rPr>
@@ -6427,10 +5633,10 @@
         </p:nvGrpSpPr>
         <p:grpSpPr>
           <a:xfrm>
-            <a:off x="4683599" y="1825993"/>
-            <a:ext cx="3434453" cy="3204189"/>
-            <a:chOff x="5048655" y="1825993"/>
-            <a:chExt cx="3434453" cy="3204189"/>
+            <a:off x="5109024" y="1825993"/>
+            <a:ext cx="3009028" cy="3204189"/>
+            <a:chOff x="5474080" y="1825993"/>
+            <a:chExt cx="3009028" cy="3204189"/>
           </a:xfrm>
         </p:grpSpPr>
         <p:cxnSp>
@@ -7534,8 +6740,8 @@
           </p:nvSpPr>
           <p:spPr>
             <a:xfrm>
-              <a:off x="5048655" y="4239133"/>
-              <a:ext cx="1142287" cy="492443"/>
+              <a:off x="5474080" y="4386935"/>
+              <a:ext cx="1288681" cy="461665"/>
             </a:xfrm>
             <a:prstGeom prst="rect">
               <a:avLst/>
@@ -7549,26 +6755,39 @@
             <a:lstStyle/>
             <a:p>
               <a:r>
-                <a:rPr lang="en-US" altLang="zh-CN" sz="1300" dirty="0">
+                <a:rPr lang="en-US" sz="1200" b="1" dirty="0">
                   <a:latin typeface="Arial" panose="020B0604020202020204" pitchFamily="34" charset="0"/>
                   <a:cs typeface="Arial" panose="020B0604020202020204" pitchFamily="34" charset="0"/>
                 </a:rPr>
-                <a:t>Two of the </a:t>
+                <a:t>Two of the</a:t>
               </a:r>
+            </a:p>
+            <a:p>
               <a:r>
-                <a:rPr lang="en-CA" altLang="zh-CN" sz="1300" dirty="0">
+                <a:rPr lang="en-US" sz="1200" b="1" dirty="0">
                   <a:latin typeface="Arial" panose="020B0604020202020204" pitchFamily="34" charset="0"/>
                   <a:cs typeface="Arial" panose="020B0604020202020204" pitchFamily="34" charset="0"/>
                 </a:rPr>
-                <a:t>three </a:t>
+                <a:t>three</a:t>
               </a:r>
               <a:r>
-                <a:rPr lang="en-CA" sz="1300" dirty="0">
+                <a:rPr lang="en-CA" sz="1200" b="1" dirty="0">
                   <a:latin typeface="Arial" panose="020B0604020202020204" pitchFamily="34" charset="0"/>
                   <a:cs typeface="Arial" panose="020B0604020202020204" pitchFamily="34" charset="0"/>
                 </a:rPr>
-                <a:t>bands</a:t>
+                <a:t> </a:t>
               </a:r>
+              <a:r>
+                <a:rPr lang="en-US" altLang="zh-CN" sz="1200" b="1" dirty="0">
+                  <a:latin typeface="Arial" panose="020B0604020202020204" pitchFamily="34" charset="0"/>
+                  <a:cs typeface="Arial" panose="020B0604020202020204" pitchFamily="34" charset="0"/>
+                </a:rPr>
+                <a:t>markers</a:t>
+              </a:r>
+              <a:endParaRPr lang="en-CA" sz="1200" b="1" dirty="0">
+                <a:latin typeface="Arial" panose="020B0604020202020204" pitchFamily="34" charset="0"/>
+                <a:cs typeface="Arial" panose="020B0604020202020204" pitchFamily="34" charset="0"/>
+              </a:endParaRPr>
             </a:p>
           </p:txBody>
         </p:sp>
@@ -7605,10 +6824,10 @@
       </p:grpSpPr>
       <p:grpSp>
         <p:nvGrpSpPr>
-          <p:cNvPr id="29" name="Group 28">
+          <p:cNvPr id="2" name="Group 1">
             <a:extLst>
               <a:ext uri="{FF2B5EF4-FFF2-40B4-BE49-F238E27FC236}">
-                <a16:creationId xmlns:a16="http://schemas.microsoft.com/office/drawing/2014/main" id="{65482CC5-E0A5-427D-99DC-769DB03EE067}"/>
+                <a16:creationId xmlns:a16="http://schemas.microsoft.com/office/drawing/2014/main" id="{E3B379DA-53A5-F344-8726-C48E0CFC9DA5}"/>
               </a:ext>
             </a:extLst>
           </p:cNvPr>
@@ -7617,653 +6836,18 @@
         </p:nvGrpSpPr>
         <p:grpSpPr>
           <a:xfrm>
-            <a:off x="4224539" y="1827817"/>
-            <a:ext cx="3742921" cy="3202365"/>
-            <a:chOff x="4240238" y="1827817"/>
-            <a:chExt cx="3742921" cy="3202365"/>
+            <a:off x="5658618" y="1827817"/>
+            <a:ext cx="2308842" cy="3202365"/>
+            <a:chOff x="5658618" y="1827817"/>
+            <a:chExt cx="2308842" cy="3202365"/>
           </a:xfrm>
         </p:grpSpPr>
-        <p:cxnSp>
-          <p:nvCxnSpPr>
-            <p:cNvPr id="3" name="Straight Connector 2">
+        <p:grpSp>
+          <p:nvGrpSpPr>
+            <p:cNvPr id="29" name="Group 28">
               <a:extLst>
                 <a:ext uri="{FF2B5EF4-FFF2-40B4-BE49-F238E27FC236}">
-                  <a16:creationId xmlns:a16="http://schemas.microsoft.com/office/drawing/2014/main" id="{8B5C4681-31A9-4FCE-B59A-338D35FC9339}"/>
-                </a:ext>
-              </a:extLst>
-            </p:cNvPr>
-            <p:cNvCxnSpPr>
-              <a:cxnSpLocks/>
-            </p:cNvCxnSpPr>
-            <p:nvPr/>
-          </p:nvCxnSpPr>
-          <p:spPr>
-            <a:xfrm>
-              <a:off x="6399638" y="4292727"/>
-              <a:ext cx="332492" cy="275690"/>
-            </a:xfrm>
-            <a:prstGeom prst="line">
-              <a:avLst/>
-            </a:prstGeom>
-            <a:ln w="203200">
-              <a:solidFill>
-                <a:schemeClr val="bg2">
-                  <a:lumMod val="75000"/>
-                </a:schemeClr>
-              </a:solidFill>
-            </a:ln>
-          </p:spPr>
-          <p:style>
-            <a:lnRef idx="1">
-              <a:schemeClr val="accent1"/>
-            </a:lnRef>
-            <a:fillRef idx="0">
-              <a:schemeClr val="accent1"/>
-            </a:fillRef>
-            <a:effectRef idx="0">
-              <a:schemeClr val="accent1"/>
-            </a:effectRef>
-            <a:fontRef idx="minor">
-              <a:schemeClr val="tx1"/>
-            </a:fontRef>
-          </p:style>
-        </p:cxnSp>
-        <p:sp>
-          <p:nvSpPr>
-            <p:cNvPr id="4" name="Freeform: Shape 3">
-              <a:extLst>
-                <a:ext uri="{FF2B5EF4-FFF2-40B4-BE49-F238E27FC236}">
-                  <a16:creationId xmlns:a16="http://schemas.microsoft.com/office/drawing/2014/main" id="{588987AB-23C6-474B-BB65-71F014A4E251}"/>
-                </a:ext>
-              </a:extLst>
-            </p:cNvPr>
-            <p:cNvSpPr/>
-            <p:nvPr/>
-          </p:nvSpPr>
-          <p:spPr>
-            <a:xfrm>
-              <a:off x="6708212" y="4378092"/>
-              <a:ext cx="914400" cy="324665"/>
-            </a:xfrm>
-            <a:custGeom>
-              <a:avLst/>
-              <a:gdLst>
-                <a:gd name="connsiteX0" fmla="*/ 0 w 914400"/>
-                <a:gd name="connsiteY0" fmla="*/ 160020 h 324665"/>
-                <a:gd name="connsiteX1" fmla="*/ 502920 w 914400"/>
-                <a:gd name="connsiteY1" fmla="*/ 320040 h 324665"/>
-                <a:gd name="connsiteX2" fmla="*/ 914400 w 914400"/>
-                <a:gd name="connsiteY2" fmla="*/ 0 h 324665"/>
-              </a:gdLst>
-              <a:ahLst/>
-              <a:cxnLst>
-                <a:cxn ang="0">
-                  <a:pos x="connsiteX0" y="connsiteY0"/>
-                </a:cxn>
-                <a:cxn ang="0">
-                  <a:pos x="connsiteX1" y="connsiteY1"/>
-                </a:cxn>
-                <a:cxn ang="0">
-                  <a:pos x="connsiteX2" y="connsiteY2"/>
-                </a:cxn>
-              </a:cxnLst>
-              <a:rect l="l" t="t" r="r" b="b"/>
-              <a:pathLst>
-                <a:path w="914400" h="324665">
-                  <a:moveTo>
-                    <a:pt x="0" y="160020"/>
-                  </a:moveTo>
-                  <a:cubicBezTo>
-                    <a:pt x="175260" y="253365"/>
-                    <a:pt x="350520" y="346710"/>
-                    <a:pt x="502920" y="320040"/>
-                  </a:cubicBezTo>
-                  <a:cubicBezTo>
-                    <a:pt x="655320" y="293370"/>
-                    <a:pt x="784860" y="146685"/>
-                    <a:pt x="914400" y="0"/>
-                  </a:cubicBezTo>
-                </a:path>
-              </a:pathLst>
-            </a:custGeom>
-            <a:noFill/>
-            <a:ln w="203200">
-              <a:solidFill>
-                <a:schemeClr val="bg2">
-                  <a:lumMod val="75000"/>
-                </a:schemeClr>
-              </a:solidFill>
-            </a:ln>
-          </p:spPr>
-          <p:style>
-            <a:lnRef idx="2">
-              <a:schemeClr val="accent1">
-                <a:shade val="50000"/>
-              </a:schemeClr>
-            </a:lnRef>
-            <a:fillRef idx="1">
-              <a:schemeClr val="accent1"/>
-            </a:fillRef>
-            <a:effectRef idx="0">
-              <a:schemeClr val="accent1"/>
-            </a:effectRef>
-            <a:fontRef idx="minor">
-              <a:schemeClr val="lt1"/>
-            </a:fontRef>
-          </p:style>
-          <p:txBody>
-            <a:bodyPr rtlCol="0" anchor="ctr"/>
-            <a:lstStyle/>
-            <a:p>
-              <a:pPr algn="ctr"/>
-              <a:endParaRPr lang="en-CA"/>
-            </a:p>
-          </p:txBody>
-        </p:sp>
-        <p:sp>
-          <p:nvSpPr>
-            <p:cNvPr id="5" name="Freeform: Shape 4">
-              <a:extLst>
-                <a:ext uri="{FF2B5EF4-FFF2-40B4-BE49-F238E27FC236}">
-                  <a16:creationId xmlns:a16="http://schemas.microsoft.com/office/drawing/2014/main" id="{15439E37-629E-428B-9C8F-CC9A53408271}"/>
-                </a:ext>
-              </a:extLst>
-            </p:cNvPr>
-            <p:cNvSpPr/>
-            <p:nvPr/>
-          </p:nvSpPr>
-          <p:spPr>
-            <a:xfrm>
-              <a:off x="7599157" y="3810615"/>
-              <a:ext cx="223846" cy="568768"/>
-            </a:xfrm>
-            <a:custGeom>
-              <a:avLst/>
-              <a:gdLst>
-                <a:gd name="connsiteX0" fmla="*/ 0 w 274320"/>
-                <a:gd name="connsiteY0" fmla="*/ 617220 h 617220"/>
-                <a:gd name="connsiteX1" fmla="*/ 182880 w 274320"/>
-                <a:gd name="connsiteY1" fmla="*/ 320040 h 617220"/>
-                <a:gd name="connsiteX2" fmla="*/ 274320 w 274320"/>
-                <a:gd name="connsiteY2" fmla="*/ 0 h 617220"/>
-              </a:gdLst>
-              <a:ahLst/>
-              <a:cxnLst>
-                <a:cxn ang="0">
-                  <a:pos x="connsiteX0" y="connsiteY0"/>
-                </a:cxn>
-                <a:cxn ang="0">
-                  <a:pos x="connsiteX1" y="connsiteY1"/>
-                </a:cxn>
-                <a:cxn ang="0">
-                  <a:pos x="connsiteX2" y="connsiteY2"/>
-                </a:cxn>
-              </a:cxnLst>
-              <a:rect l="l" t="t" r="r" b="b"/>
-              <a:pathLst>
-                <a:path w="274320" h="617220">
-                  <a:moveTo>
-                    <a:pt x="0" y="617220"/>
-                  </a:moveTo>
-                  <a:cubicBezTo>
-                    <a:pt x="68580" y="520065"/>
-                    <a:pt x="137160" y="422910"/>
-                    <a:pt x="182880" y="320040"/>
-                  </a:cubicBezTo>
-                  <a:cubicBezTo>
-                    <a:pt x="228600" y="217170"/>
-                    <a:pt x="251460" y="108585"/>
-                    <a:pt x="274320" y="0"/>
-                  </a:cubicBezTo>
-                </a:path>
-              </a:pathLst>
-            </a:custGeom>
-            <a:noFill/>
-            <a:ln w="203200">
-              <a:solidFill>
-                <a:schemeClr val="bg2">
-                  <a:lumMod val="75000"/>
-                </a:schemeClr>
-              </a:solidFill>
-            </a:ln>
-          </p:spPr>
-          <p:style>
-            <a:lnRef idx="2">
-              <a:schemeClr val="accent1">
-                <a:shade val="50000"/>
-              </a:schemeClr>
-            </a:lnRef>
-            <a:fillRef idx="1">
-              <a:schemeClr val="accent1"/>
-            </a:fillRef>
-            <a:effectRef idx="0">
-              <a:schemeClr val="accent1"/>
-            </a:effectRef>
-            <a:fontRef idx="minor">
-              <a:schemeClr val="lt1"/>
-            </a:fontRef>
-          </p:style>
-          <p:txBody>
-            <a:bodyPr rtlCol="0" anchor="ctr"/>
-            <a:lstStyle/>
-            <a:p>
-              <a:pPr algn="ctr"/>
-              <a:endParaRPr lang="en-CA"/>
-            </a:p>
-          </p:txBody>
-        </p:sp>
-        <p:sp>
-          <p:nvSpPr>
-            <p:cNvPr id="6" name="Oval 5">
-              <a:extLst>
-                <a:ext uri="{FF2B5EF4-FFF2-40B4-BE49-F238E27FC236}">
-                  <a16:creationId xmlns:a16="http://schemas.microsoft.com/office/drawing/2014/main" id="{31F93B1D-9900-41AA-9E1D-960CAA64F384}"/>
-                </a:ext>
-              </a:extLst>
-            </p:cNvPr>
-            <p:cNvSpPr/>
-            <p:nvPr/>
-          </p:nvSpPr>
-          <p:spPr>
-            <a:xfrm rot="19950599">
-              <a:off x="5679844" y="2083782"/>
-              <a:ext cx="2104572" cy="2946400"/>
-            </a:xfrm>
-            <a:prstGeom prst="ellipse">
-              <a:avLst/>
-            </a:prstGeom>
-            <a:solidFill>
-              <a:schemeClr val="bg1">
-                <a:lumMod val="85000"/>
-                <a:alpha val="60000"/>
-              </a:schemeClr>
-            </a:solidFill>
-            <a:ln w="31750">
-              <a:solidFill>
-                <a:schemeClr val="tx1"/>
-              </a:solidFill>
-            </a:ln>
-          </p:spPr>
-          <p:style>
-            <a:lnRef idx="2">
-              <a:schemeClr val="accent1">
-                <a:shade val="50000"/>
-              </a:schemeClr>
-            </a:lnRef>
-            <a:fillRef idx="1">
-              <a:schemeClr val="accent1"/>
-            </a:fillRef>
-            <a:effectRef idx="0">
-              <a:schemeClr val="accent1"/>
-            </a:effectRef>
-            <a:fontRef idx="minor">
-              <a:schemeClr val="lt1"/>
-            </a:fontRef>
-          </p:style>
-          <p:txBody>
-            <a:bodyPr rtlCol="0" anchor="ctr"/>
-            <a:lstStyle/>
-            <a:p>
-              <a:pPr algn="ctr"/>
-              <a:endParaRPr lang="en-CA"/>
-            </a:p>
-          </p:txBody>
-        </p:sp>
-        <p:sp>
-          <p:nvSpPr>
-            <p:cNvPr id="7" name="Oval 6">
-              <a:extLst>
-                <a:ext uri="{FF2B5EF4-FFF2-40B4-BE49-F238E27FC236}">
-                  <a16:creationId xmlns:a16="http://schemas.microsoft.com/office/drawing/2014/main" id="{D5830F52-411A-4D66-9EE0-75C0C4C4CA2F}"/>
-                </a:ext>
-              </a:extLst>
-            </p:cNvPr>
-            <p:cNvSpPr/>
-            <p:nvPr/>
-          </p:nvSpPr>
-          <p:spPr>
-            <a:xfrm rot="19950599">
-              <a:off x="6357385" y="2236143"/>
-              <a:ext cx="1574777" cy="2171337"/>
-            </a:xfrm>
-            <a:prstGeom prst="ellipse">
-              <a:avLst/>
-            </a:prstGeom>
-            <a:solidFill>
-              <a:schemeClr val="bg1">
-                <a:lumMod val="75000"/>
-              </a:schemeClr>
-            </a:solidFill>
-            <a:ln w="31750">
-              <a:solidFill>
-                <a:schemeClr val="tx1"/>
-              </a:solidFill>
-            </a:ln>
-          </p:spPr>
-          <p:style>
-            <a:lnRef idx="2">
-              <a:schemeClr val="accent1">
-                <a:shade val="50000"/>
-              </a:schemeClr>
-            </a:lnRef>
-            <a:fillRef idx="1">
-              <a:schemeClr val="accent1"/>
-            </a:fillRef>
-            <a:effectRef idx="0">
-              <a:schemeClr val="accent1"/>
-            </a:effectRef>
-            <a:fontRef idx="minor">
-              <a:schemeClr val="lt1"/>
-            </a:fontRef>
-          </p:style>
-          <p:txBody>
-            <a:bodyPr rtlCol="0" anchor="ctr"/>
-            <a:lstStyle/>
-            <a:p>
-              <a:pPr algn="ctr"/>
-              <a:endParaRPr lang="en-CA"/>
-            </a:p>
-          </p:txBody>
-        </p:sp>
-        <p:sp>
-          <p:nvSpPr>
-            <p:cNvPr id="8" name="Oval 7">
-              <a:extLst>
-                <a:ext uri="{FF2B5EF4-FFF2-40B4-BE49-F238E27FC236}">
-                  <a16:creationId xmlns:a16="http://schemas.microsoft.com/office/drawing/2014/main" id="{F10994CB-D3B6-422C-8001-F59B78EBC2DB}"/>
-                </a:ext>
-              </a:extLst>
-            </p:cNvPr>
-            <p:cNvSpPr/>
-            <p:nvPr/>
-          </p:nvSpPr>
-          <p:spPr>
-            <a:xfrm rot="19950599">
-              <a:off x="6968198" y="2499669"/>
-              <a:ext cx="1014961" cy="1323886"/>
-            </a:xfrm>
-            <a:prstGeom prst="ellipse">
-              <a:avLst/>
-            </a:prstGeom>
-            <a:gradFill flip="none" rotWithShape="1">
-              <a:gsLst>
-                <a:gs pos="0">
-                  <a:schemeClr val="accent1">
-                    <a:lumMod val="5000"/>
-                    <a:lumOff val="95000"/>
-                  </a:schemeClr>
-                </a:gs>
-                <a:gs pos="100000">
-                  <a:schemeClr val="bg1">
-                    <a:lumMod val="65000"/>
-                  </a:schemeClr>
-                </a:gs>
-                <a:gs pos="21000">
-                  <a:schemeClr val="bg1">
-                    <a:lumMod val="95000"/>
-                  </a:schemeClr>
-                </a:gs>
-                <a:gs pos="72000">
-                  <a:schemeClr val="bg1">
-                    <a:lumMod val="75000"/>
-                  </a:schemeClr>
-                </a:gs>
-                <a:gs pos="44000">
-                  <a:schemeClr val="bg1">
-                    <a:lumMod val="85000"/>
-                  </a:schemeClr>
-                </a:gs>
-              </a:gsLst>
-              <a:path path="circle">
-                <a:fillToRect l="100000" t="100000"/>
-              </a:path>
-              <a:tileRect r="-100000" b="-100000"/>
-            </a:gradFill>
-            <a:ln w="31750">
-              <a:solidFill>
-                <a:schemeClr val="tx1"/>
-              </a:solidFill>
-            </a:ln>
-          </p:spPr>
-          <p:style>
-            <a:lnRef idx="2">
-              <a:schemeClr val="accent1">
-                <a:shade val="50000"/>
-              </a:schemeClr>
-            </a:lnRef>
-            <a:fillRef idx="1">
-              <a:schemeClr val="accent1"/>
-            </a:fillRef>
-            <a:effectRef idx="0">
-              <a:schemeClr val="accent1"/>
-            </a:effectRef>
-            <a:fontRef idx="minor">
-              <a:schemeClr val="lt1"/>
-            </a:fontRef>
-          </p:style>
-          <p:txBody>
-            <a:bodyPr rtlCol="0" anchor="ctr"/>
-            <a:lstStyle/>
-            <a:p>
-              <a:pPr algn="ctr"/>
-              <a:endParaRPr lang="en-CA"/>
-            </a:p>
-          </p:txBody>
-        </p:sp>
-        <p:sp>
-          <p:nvSpPr>
-            <p:cNvPr id="9" name="Oval 8">
-              <a:extLst>
-                <a:ext uri="{FF2B5EF4-FFF2-40B4-BE49-F238E27FC236}">
-                  <a16:creationId xmlns:a16="http://schemas.microsoft.com/office/drawing/2014/main" id="{ED57D3CC-BD9A-4921-A211-EDC2AA2190A7}"/>
-                </a:ext>
-              </a:extLst>
-            </p:cNvPr>
-            <p:cNvSpPr/>
-            <p:nvPr/>
-          </p:nvSpPr>
-          <p:spPr>
-            <a:xfrm rot="19464236">
-              <a:off x="6005881" y="3852631"/>
-              <a:ext cx="410873" cy="517809"/>
-            </a:xfrm>
-            <a:prstGeom prst="ellipse">
-              <a:avLst/>
-            </a:prstGeom>
-            <a:noFill/>
-            <a:ln w="31750">
-              <a:solidFill>
-                <a:schemeClr val="tx1"/>
-              </a:solidFill>
-            </a:ln>
-          </p:spPr>
-          <p:style>
-            <a:lnRef idx="2">
-              <a:schemeClr val="accent1">
-                <a:shade val="50000"/>
-              </a:schemeClr>
-            </a:lnRef>
-            <a:fillRef idx="1">
-              <a:schemeClr val="accent1"/>
-            </a:fillRef>
-            <a:effectRef idx="0">
-              <a:schemeClr val="accent1"/>
-            </a:effectRef>
-            <a:fontRef idx="minor">
-              <a:schemeClr val="lt1"/>
-            </a:fontRef>
-          </p:style>
-          <p:txBody>
-            <a:bodyPr rtlCol="0" anchor="ctr"/>
-            <a:lstStyle/>
-            <a:p>
-              <a:pPr algn="ctr"/>
-              <a:endParaRPr lang="en-CA" dirty="0"/>
-            </a:p>
-          </p:txBody>
-        </p:sp>
-        <p:sp>
-          <p:nvSpPr>
-            <p:cNvPr id="10" name="Oval 9">
-              <a:extLst>
-                <a:ext uri="{FF2B5EF4-FFF2-40B4-BE49-F238E27FC236}">
-                  <a16:creationId xmlns:a16="http://schemas.microsoft.com/office/drawing/2014/main" id="{2886B050-2496-4876-AE0D-2813B823A2D0}"/>
-                </a:ext>
-              </a:extLst>
-            </p:cNvPr>
-            <p:cNvSpPr/>
-            <p:nvPr/>
-          </p:nvSpPr>
-          <p:spPr>
-            <a:xfrm rot="312357">
-              <a:off x="5674650" y="2626284"/>
-              <a:ext cx="319038" cy="536718"/>
-            </a:xfrm>
-            <a:prstGeom prst="ellipse">
-              <a:avLst/>
-            </a:prstGeom>
-            <a:gradFill>
-              <a:gsLst>
-                <a:gs pos="0">
-                  <a:schemeClr val="accent1">
-                    <a:lumMod val="5000"/>
-                    <a:lumOff val="95000"/>
-                  </a:schemeClr>
-                </a:gs>
-                <a:gs pos="100000">
-                  <a:schemeClr val="bg2">
-                    <a:lumMod val="50000"/>
-                  </a:schemeClr>
-                </a:gs>
-                <a:gs pos="82000">
-                  <a:schemeClr val="bg2">
-                    <a:lumMod val="50000"/>
-                  </a:schemeClr>
-                </a:gs>
-                <a:gs pos="54000">
-                  <a:schemeClr val="bg2">
-                    <a:lumMod val="75000"/>
-                  </a:schemeClr>
-                </a:gs>
-              </a:gsLst>
-              <a:path path="circle">
-                <a:fillToRect l="100000" t="100000"/>
-              </a:path>
-            </a:gradFill>
-            <a:ln w="31750">
-              <a:solidFill>
-                <a:schemeClr val="tx1"/>
-              </a:solidFill>
-            </a:ln>
-          </p:spPr>
-          <p:style>
-            <a:lnRef idx="2">
-              <a:schemeClr val="accent1">
-                <a:shade val="50000"/>
-              </a:schemeClr>
-            </a:lnRef>
-            <a:fillRef idx="1">
-              <a:schemeClr val="accent1"/>
-            </a:fillRef>
-            <a:effectRef idx="0">
-              <a:schemeClr val="accent1"/>
-            </a:effectRef>
-            <a:fontRef idx="minor">
-              <a:schemeClr val="lt1"/>
-            </a:fontRef>
-          </p:style>
-          <p:txBody>
-            <a:bodyPr rtlCol="0" anchor="ctr"/>
-            <a:lstStyle/>
-            <a:p>
-              <a:pPr algn="ctr"/>
-              <a:endParaRPr lang="en-CA" dirty="0"/>
-            </a:p>
-          </p:txBody>
-        </p:sp>
-        <p:sp>
-          <p:nvSpPr>
-            <p:cNvPr id="11" name="Rectangle 10">
-              <a:extLst>
-                <a:ext uri="{FF2B5EF4-FFF2-40B4-BE49-F238E27FC236}">
-                  <a16:creationId xmlns:a16="http://schemas.microsoft.com/office/drawing/2014/main" id="{CE927282-D4D4-401B-8137-A11B88A5A181}"/>
-                </a:ext>
-              </a:extLst>
-            </p:cNvPr>
-            <p:cNvSpPr>
-              <a:spLocks/>
-            </p:cNvSpPr>
-            <p:nvPr/>
-          </p:nvSpPr>
-          <p:spPr>
-            <a:xfrm rot="18829783">
-              <a:off x="6201571" y="4042525"/>
-              <a:ext cx="176269" cy="271307"/>
-            </a:xfrm>
-            <a:prstGeom prst="rect">
-              <a:avLst/>
-            </a:prstGeom>
-            <a:gradFill flip="none" rotWithShape="1">
-              <a:gsLst>
-                <a:gs pos="0">
-                  <a:schemeClr val="bg1">
-                    <a:lumMod val="85000"/>
-                  </a:schemeClr>
-                </a:gs>
-                <a:gs pos="100000">
-                  <a:schemeClr val="bg2">
-                    <a:lumMod val="50000"/>
-                  </a:schemeClr>
-                </a:gs>
-                <a:gs pos="71000">
-                  <a:schemeClr val="bg2">
-                    <a:lumMod val="50000"/>
-                  </a:schemeClr>
-                </a:gs>
-                <a:gs pos="20000">
-                  <a:schemeClr val="bg1">
-                    <a:lumMod val="65000"/>
-                  </a:schemeClr>
-                </a:gs>
-              </a:gsLst>
-              <a:lin ang="0" scaled="0"/>
-              <a:tileRect/>
-            </a:gradFill>
-            <a:ln>
-              <a:noFill/>
-            </a:ln>
-          </p:spPr>
-          <p:style>
-            <a:lnRef idx="2">
-              <a:schemeClr val="accent1">
-                <a:shade val="50000"/>
-              </a:schemeClr>
-            </a:lnRef>
-            <a:fillRef idx="1">
-              <a:schemeClr val="accent1"/>
-            </a:fillRef>
-            <a:effectRef idx="0">
-              <a:schemeClr val="accent1"/>
-            </a:effectRef>
-            <a:fontRef idx="minor">
-              <a:schemeClr val="lt1"/>
-            </a:fontRef>
-          </p:style>
-          <p:txBody>
-            <a:bodyPr rtlCol="0" anchor="ctr"/>
-            <a:lstStyle/>
-            <a:p>
-              <a:pPr algn="ctr"/>
-              <a:endParaRPr lang="en-CA"/>
-            </a:p>
-          </p:txBody>
-        </p:sp>
-        <p:grpSp>
-          <p:nvGrpSpPr>
-            <p:cNvPr id="14" name="Group 13">
-              <a:extLst>
-                <a:ext uri="{FF2B5EF4-FFF2-40B4-BE49-F238E27FC236}">
-                  <a16:creationId xmlns:a16="http://schemas.microsoft.com/office/drawing/2014/main" id="{2A512D90-22D3-450C-B8C0-FCF7428C4A81}"/>
+                  <a16:creationId xmlns:a16="http://schemas.microsoft.com/office/drawing/2014/main" id="{65482CC5-E0A5-427D-99DC-769DB03EE067}"/>
                 </a:ext>
               </a:extLst>
             </p:cNvPr>
@@ -8272,18 +6856,63 @@
           </p:nvGrpSpPr>
           <p:grpSpPr>
             <a:xfrm>
-              <a:off x="5970976" y="3937517"/>
-              <a:ext cx="406329" cy="241842"/>
-              <a:chOff x="5471532" y="2491845"/>
-              <a:chExt cx="406329" cy="241842"/>
+              <a:off x="5658951" y="1827817"/>
+              <a:ext cx="2308509" cy="3202365"/>
+              <a:chOff x="5674650" y="1827817"/>
+              <a:chExt cx="2308509" cy="3202365"/>
             </a:xfrm>
           </p:grpSpPr>
+          <p:cxnSp>
+            <p:nvCxnSpPr>
+              <p:cNvPr id="3" name="Straight Connector 2">
+                <a:extLst>
+                  <a:ext uri="{FF2B5EF4-FFF2-40B4-BE49-F238E27FC236}">
+                    <a16:creationId xmlns:a16="http://schemas.microsoft.com/office/drawing/2014/main" id="{8B5C4681-31A9-4FCE-B59A-338D35FC9339}"/>
+                  </a:ext>
+                </a:extLst>
+              </p:cNvPr>
+              <p:cNvCxnSpPr>
+                <a:cxnSpLocks/>
+              </p:cNvCxnSpPr>
+              <p:nvPr/>
+            </p:nvCxnSpPr>
+            <p:spPr>
+              <a:xfrm>
+                <a:off x="6399638" y="4292727"/>
+                <a:ext cx="332492" cy="275690"/>
+              </a:xfrm>
+              <a:prstGeom prst="line">
+                <a:avLst/>
+              </a:prstGeom>
+              <a:ln w="203200">
+                <a:solidFill>
+                  <a:schemeClr val="bg2">
+                    <a:lumMod val="75000"/>
+                  </a:schemeClr>
+                </a:solidFill>
+              </a:ln>
+            </p:spPr>
+            <p:style>
+              <a:lnRef idx="1">
+                <a:schemeClr val="accent1"/>
+              </a:lnRef>
+              <a:fillRef idx="0">
+                <a:schemeClr val="accent1"/>
+              </a:fillRef>
+              <a:effectRef idx="0">
+                <a:schemeClr val="accent1"/>
+              </a:effectRef>
+              <a:fontRef idx="minor">
+                <a:schemeClr val="tx1"/>
+              </a:fontRef>
+            </p:style>
+          </p:cxnSp>
           <p:sp>
             <p:nvSpPr>
-              <p:cNvPr id="20" name="Rectangle: Rounded Corners 19">
+              <p:cNvPr id="4" name="Freeform: Shape 3">
                 <a:extLst>
                   <a:ext uri="{FF2B5EF4-FFF2-40B4-BE49-F238E27FC236}">
-                    <a16:creationId xmlns:a16="http://schemas.microsoft.com/office/drawing/2014/main" id="{B78B4723-805D-4112-B441-D35D4AA5EA31}"/>
+                    <a16:creationId xmlns:a16="http://schemas.microsoft.com/office/drawing/2014/main" id="{588987AB-23C6-474B-BB65-71F014A4E251}"/>
                   </a:ext>
                 </a:extLst>
               </p:cNvPr>
@@ -8291,38 +6920,552 @@
               <p:nvPr/>
             </p:nvSpPr>
             <p:spPr>
-              <a:xfrm rot="2695155" flipH="1">
-                <a:off x="5471532" y="2491845"/>
-                <a:ext cx="327882" cy="192416"/>
+              <a:xfrm>
+                <a:off x="6708212" y="4378092"/>
+                <a:ext cx="914400" cy="324665"/>
               </a:xfrm>
-              <a:prstGeom prst="roundRect">
+              <a:custGeom>
+                <a:avLst/>
+                <a:gdLst>
+                  <a:gd name="connsiteX0" fmla="*/ 0 w 914400"/>
+                  <a:gd name="connsiteY0" fmla="*/ 160020 h 324665"/>
+                  <a:gd name="connsiteX1" fmla="*/ 502920 w 914400"/>
+                  <a:gd name="connsiteY1" fmla="*/ 320040 h 324665"/>
+                  <a:gd name="connsiteX2" fmla="*/ 914400 w 914400"/>
+                  <a:gd name="connsiteY2" fmla="*/ 0 h 324665"/>
+                </a:gdLst>
+                <a:ahLst/>
+                <a:cxnLst>
+                  <a:cxn ang="0">
+                    <a:pos x="connsiteX0" y="connsiteY0"/>
+                  </a:cxn>
+                  <a:cxn ang="0">
+                    <a:pos x="connsiteX1" y="connsiteY1"/>
+                  </a:cxn>
+                  <a:cxn ang="0">
+                    <a:pos x="connsiteX2" y="connsiteY2"/>
+                  </a:cxn>
+                </a:cxnLst>
+                <a:rect l="l" t="t" r="r" b="b"/>
+                <a:pathLst>
+                  <a:path w="914400" h="324665">
+                    <a:moveTo>
+                      <a:pt x="0" y="160020"/>
+                    </a:moveTo>
+                    <a:cubicBezTo>
+                      <a:pt x="175260" y="253365"/>
+                      <a:pt x="350520" y="346710"/>
+                      <a:pt x="502920" y="320040"/>
+                    </a:cubicBezTo>
+                    <a:cubicBezTo>
+                      <a:pt x="655320" y="293370"/>
+                      <a:pt x="784860" y="146685"/>
+                      <a:pt x="914400" y="0"/>
+                    </a:cubicBezTo>
+                  </a:path>
+                </a:pathLst>
+              </a:custGeom>
+              <a:noFill/>
+              <a:ln w="203200">
+                <a:solidFill>
+                  <a:schemeClr val="bg2">
+                    <a:lumMod val="75000"/>
+                  </a:schemeClr>
+                </a:solidFill>
+              </a:ln>
+            </p:spPr>
+            <p:style>
+              <a:lnRef idx="2">
+                <a:schemeClr val="accent1">
+                  <a:shade val="50000"/>
+                </a:schemeClr>
+              </a:lnRef>
+              <a:fillRef idx="1">
+                <a:schemeClr val="accent1"/>
+              </a:fillRef>
+              <a:effectRef idx="0">
+                <a:schemeClr val="accent1"/>
+              </a:effectRef>
+              <a:fontRef idx="minor">
+                <a:schemeClr val="lt1"/>
+              </a:fontRef>
+            </p:style>
+            <p:txBody>
+              <a:bodyPr rtlCol="0" anchor="ctr"/>
+              <a:lstStyle/>
+              <a:p>
+                <a:pPr algn="ctr"/>
+                <a:endParaRPr lang="en-CA"/>
+              </a:p>
+            </p:txBody>
+          </p:sp>
+          <p:sp>
+            <p:nvSpPr>
+              <p:cNvPr id="5" name="Freeform: Shape 4">
+                <a:extLst>
+                  <a:ext uri="{FF2B5EF4-FFF2-40B4-BE49-F238E27FC236}">
+                    <a16:creationId xmlns:a16="http://schemas.microsoft.com/office/drawing/2014/main" id="{15439E37-629E-428B-9C8F-CC9A53408271}"/>
+                  </a:ext>
+                </a:extLst>
+              </p:cNvPr>
+              <p:cNvSpPr/>
+              <p:nvPr/>
+            </p:nvSpPr>
+            <p:spPr>
+              <a:xfrm>
+                <a:off x="7599157" y="3810615"/>
+                <a:ext cx="223846" cy="568768"/>
+              </a:xfrm>
+              <a:custGeom>
+                <a:avLst/>
+                <a:gdLst>
+                  <a:gd name="connsiteX0" fmla="*/ 0 w 274320"/>
+                  <a:gd name="connsiteY0" fmla="*/ 617220 h 617220"/>
+                  <a:gd name="connsiteX1" fmla="*/ 182880 w 274320"/>
+                  <a:gd name="connsiteY1" fmla="*/ 320040 h 617220"/>
+                  <a:gd name="connsiteX2" fmla="*/ 274320 w 274320"/>
+                  <a:gd name="connsiteY2" fmla="*/ 0 h 617220"/>
+                </a:gdLst>
+                <a:ahLst/>
+                <a:cxnLst>
+                  <a:cxn ang="0">
+                    <a:pos x="connsiteX0" y="connsiteY0"/>
+                  </a:cxn>
+                  <a:cxn ang="0">
+                    <a:pos x="connsiteX1" y="connsiteY1"/>
+                  </a:cxn>
+                  <a:cxn ang="0">
+                    <a:pos x="connsiteX2" y="connsiteY2"/>
+                  </a:cxn>
+                </a:cxnLst>
+                <a:rect l="l" t="t" r="r" b="b"/>
+                <a:pathLst>
+                  <a:path w="274320" h="617220">
+                    <a:moveTo>
+                      <a:pt x="0" y="617220"/>
+                    </a:moveTo>
+                    <a:cubicBezTo>
+                      <a:pt x="68580" y="520065"/>
+                      <a:pt x="137160" y="422910"/>
+                      <a:pt x="182880" y="320040"/>
+                    </a:cubicBezTo>
+                    <a:cubicBezTo>
+                      <a:pt x="228600" y="217170"/>
+                      <a:pt x="251460" y="108585"/>
+                      <a:pt x="274320" y="0"/>
+                    </a:cubicBezTo>
+                  </a:path>
+                </a:pathLst>
+              </a:custGeom>
+              <a:noFill/>
+              <a:ln w="203200">
+                <a:solidFill>
+                  <a:schemeClr val="bg2">
+                    <a:lumMod val="75000"/>
+                  </a:schemeClr>
+                </a:solidFill>
+              </a:ln>
+            </p:spPr>
+            <p:style>
+              <a:lnRef idx="2">
+                <a:schemeClr val="accent1">
+                  <a:shade val="50000"/>
+                </a:schemeClr>
+              </a:lnRef>
+              <a:fillRef idx="1">
+                <a:schemeClr val="accent1"/>
+              </a:fillRef>
+              <a:effectRef idx="0">
+                <a:schemeClr val="accent1"/>
+              </a:effectRef>
+              <a:fontRef idx="minor">
+                <a:schemeClr val="lt1"/>
+              </a:fontRef>
+            </p:style>
+            <p:txBody>
+              <a:bodyPr rtlCol="0" anchor="ctr"/>
+              <a:lstStyle/>
+              <a:p>
+                <a:pPr algn="ctr"/>
+                <a:endParaRPr lang="en-CA"/>
+              </a:p>
+            </p:txBody>
+          </p:sp>
+          <p:sp>
+            <p:nvSpPr>
+              <p:cNvPr id="6" name="Oval 5">
+                <a:extLst>
+                  <a:ext uri="{FF2B5EF4-FFF2-40B4-BE49-F238E27FC236}">
+                    <a16:creationId xmlns:a16="http://schemas.microsoft.com/office/drawing/2014/main" id="{31F93B1D-9900-41AA-9E1D-960CAA64F384}"/>
+                  </a:ext>
+                </a:extLst>
+              </p:cNvPr>
+              <p:cNvSpPr/>
+              <p:nvPr/>
+            </p:nvSpPr>
+            <p:spPr>
+              <a:xfrm rot="19950599">
+                <a:off x="5679844" y="2083782"/>
+                <a:ext cx="2104572" cy="2946400"/>
+              </a:xfrm>
+              <a:prstGeom prst="ellipse">
+                <a:avLst/>
+              </a:prstGeom>
+              <a:solidFill>
+                <a:schemeClr val="bg1">
+                  <a:lumMod val="85000"/>
+                  <a:alpha val="60000"/>
+                </a:schemeClr>
+              </a:solidFill>
+              <a:ln w="31750">
+                <a:solidFill>
+                  <a:schemeClr val="tx1"/>
+                </a:solidFill>
+              </a:ln>
+            </p:spPr>
+            <p:style>
+              <a:lnRef idx="2">
+                <a:schemeClr val="accent1">
+                  <a:shade val="50000"/>
+                </a:schemeClr>
+              </a:lnRef>
+              <a:fillRef idx="1">
+                <a:schemeClr val="accent1"/>
+              </a:fillRef>
+              <a:effectRef idx="0">
+                <a:schemeClr val="accent1"/>
+              </a:effectRef>
+              <a:fontRef idx="minor">
+                <a:schemeClr val="lt1"/>
+              </a:fontRef>
+            </p:style>
+            <p:txBody>
+              <a:bodyPr rtlCol="0" anchor="ctr"/>
+              <a:lstStyle/>
+              <a:p>
+                <a:pPr algn="ctr"/>
+                <a:endParaRPr lang="en-CA"/>
+              </a:p>
+            </p:txBody>
+          </p:sp>
+          <p:sp>
+            <p:nvSpPr>
+              <p:cNvPr id="7" name="Oval 6">
+                <a:extLst>
+                  <a:ext uri="{FF2B5EF4-FFF2-40B4-BE49-F238E27FC236}">
+                    <a16:creationId xmlns:a16="http://schemas.microsoft.com/office/drawing/2014/main" id="{D5830F52-411A-4D66-9EE0-75C0C4C4CA2F}"/>
+                  </a:ext>
+                </a:extLst>
+              </p:cNvPr>
+              <p:cNvSpPr/>
+              <p:nvPr/>
+            </p:nvSpPr>
+            <p:spPr>
+              <a:xfrm rot="19950599">
+                <a:off x="6357385" y="2236143"/>
+                <a:ext cx="1574777" cy="2171337"/>
+              </a:xfrm>
+              <a:prstGeom prst="ellipse">
+                <a:avLst/>
+              </a:prstGeom>
+              <a:solidFill>
+                <a:schemeClr val="bg1">
+                  <a:lumMod val="75000"/>
+                </a:schemeClr>
+              </a:solidFill>
+              <a:ln w="31750">
+                <a:solidFill>
+                  <a:schemeClr val="tx1"/>
+                </a:solidFill>
+              </a:ln>
+            </p:spPr>
+            <p:style>
+              <a:lnRef idx="2">
+                <a:schemeClr val="accent1">
+                  <a:shade val="50000"/>
+                </a:schemeClr>
+              </a:lnRef>
+              <a:fillRef idx="1">
+                <a:schemeClr val="accent1"/>
+              </a:fillRef>
+              <a:effectRef idx="0">
+                <a:schemeClr val="accent1"/>
+              </a:effectRef>
+              <a:fontRef idx="minor">
+                <a:schemeClr val="lt1"/>
+              </a:fontRef>
+            </p:style>
+            <p:txBody>
+              <a:bodyPr rtlCol="0" anchor="ctr"/>
+              <a:lstStyle/>
+              <a:p>
+                <a:pPr algn="ctr"/>
+                <a:endParaRPr lang="en-CA"/>
+              </a:p>
+            </p:txBody>
+          </p:sp>
+          <p:sp>
+            <p:nvSpPr>
+              <p:cNvPr id="8" name="Oval 7">
+                <a:extLst>
+                  <a:ext uri="{FF2B5EF4-FFF2-40B4-BE49-F238E27FC236}">
+                    <a16:creationId xmlns:a16="http://schemas.microsoft.com/office/drawing/2014/main" id="{F10994CB-D3B6-422C-8001-F59B78EBC2DB}"/>
+                  </a:ext>
+                </a:extLst>
+              </p:cNvPr>
+              <p:cNvSpPr/>
+              <p:nvPr/>
+            </p:nvSpPr>
+            <p:spPr>
+              <a:xfrm rot="19950599">
+                <a:off x="6968198" y="2499669"/>
+                <a:ext cx="1014961" cy="1323886"/>
+              </a:xfrm>
+              <a:prstGeom prst="ellipse">
                 <a:avLst/>
               </a:prstGeom>
               <a:gradFill flip="none" rotWithShape="1">
                 <a:gsLst>
+                  <a:gs pos="0">
+                    <a:schemeClr val="accent1">
+                      <a:lumMod val="5000"/>
+                      <a:lumOff val="95000"/>
+                    </a:schemeClr>
+                  </a:gs>
+                  <a:gs pos="100000">
+                    <a:schemeClr val="bg1">
+                      <a:lumMod val="65000"/>
+                    </a:schemeClr>
+                  </a:gs>
+                  <a:gs pos="21000">
+                    <a:schemeClr val="bg1">
+                      <a:lumMod val="95000"/>
+                    </a:schemeClr>
+                  </a:gs>
+                  <a:gs pos="72000">
+                    <a:schemeClr val="bg1">
+                      <a:lumMod val="75000"/>
+                    </a:schemeClr>
+                  </a:gs>
+                  <a:gs pos="44000">
+                    <a:schemeClr val="bg1">
+                      <a:lumMod val="85000"/>
+                    </a:schemeClr>
+                  </a:gs>
+                </a:gsLst>
+                <a:path path="circle">
+                  <a:fillToRect l="100000" t="100000"/>
+                </a:path>
+                <a:tileRect r="-100000" b="-100000"/>
+              </a:gradFill>
+              <a:ln w="31750">
+                <a:solidFill>
+                  <a:schemeClr val="tx1"/>
+                </a:solidFill>
+              </a:ln>
+            </p:spPr>
+            <p:style>
+              <a:lnRef idx="2">
+                <a:schemeClr val="accent1">
+                  <a:shade val="50000"/>
+                </a:schemeClr>
+              </a:lnRef>
+              <a:fillRef idx="1">
+                <a:schemeClr val="accent1"/>
+              </a:fillRef>
+              <a:effectRef idx="0">
+                <a:schemeClr val="accent1"/>
+              </a:effectRef>
+              <a:fontRef idx="minor">
+                <a:schemeClr val="lt1"/>
+              </a:fontRef>
+            </p:style>
+            <p:txBody>
+              <a:bodyPr rtlCol="0" anchor="ctr"/>
+              <a:lstStyle/>
+              <a:p>
+                <a:pPr algn="ctr"/>
+                <a:endParaRPr lang="en-CA"/>
+              </a:p>
+            </p:txBody>
+          </p:sp>
+          <p:sp>
+            <p:nvSpPr>
+              <p:cNvPr id="9" name="Oval 8">
+                <a:extLst>
+                  <a:ext uri="{FF2B5EF4-FFF2-40B4-BE49-F238E27FC236}">
+                    <a16:creationId xmlns:a16="http://schemas.microsoft.com/office/drawing/2014/main" id="{ED57D3CC-BD9A-4921-A211-EDC2AA2190A7}"/>
+                  </a:ext>
+                </a:extLst>
+              </p:cNvPr>
+              <p:cNvSpPr/>
+              <p:nvPr/>
+            </p:nvSpPr>
+            <p:spPr>
+              <a:xfrm rot="19464236">
+                <a:off x="6005881" y="3852631"/>
+                <a:ext cx="410873" cy="517809"/>
+              </a:xfrm>
+              <a:prstGeom prst="ellipse">
+                <a:avLst/>
+              </a:prstGeom>
+              <a:noFill/>
+              <a:ln w="31750">
+                <a:solidFill>
+                  <a:schemeClr val="tx1"/>
+                </a:solidFill>
+              </a:ln>
+            </p:spPr>
+            <p:style>
+              <a:lnRef idx="2">
+                <a:schemeClr val="accent1">
+                  <a:shade val="50000"/>
+                </a:schemeClr>
+              </a:lnRef>
+              <a:fillRef idx="1">
+                <a:schemeClr val="accent1"/>
+              </a:fillRef>
+              <a:effectRef idx="0">
+                <a:schemeClr val="accent1"/>
+              </a:effectRef>
+              <a:fontRef idx="minor">
+                <a:schemeClr val="lt1"/>
+              </a:fontRef>
+            </p:style>
+            <p:txBody>
+              <a:bodyPr rtlCol="0" anchor="ctr"/>
+              <a:lstStyle/>
+              <a:p>
+                <a:pPr algn="ctr"/>
+                <a:endParaRPr lang="en-CA" dirty="0"/>
+              </a:p>
+            </p:txBody>
+          </p:sp>
+          <p:sp>
+            <p:nvSpPr>
+              <p:cNvPr id="10" name="Oval 9">
+                <a:extLst>
+                  <a:ext uri="{FF2B5EF4-FFF2-40B4-BE49-F238E27FC236}">
+                    <a16:creationId xmlns:a16="http://schemas.microsoft.com/office/drawing/2014/main" id="{2886B050-2496-4876-AE0D-2813B823A2D0}"/>
+                  </a:ext>
+                </a:extLst>
+              </p:cNvPr>
+              <p:cNvSpPr/>
+              <p:nvPr/>
+            </p:nvSpPr>
+            <p:spPr>
+              <a:xfrm rot="312357">
+                <a:off x="5674650" y="2626284"/>
+                <a:ext cx="319038" cy="536718"/>
+              </a:xfrm>
+              <a:prstGeom prst="ellipse">
+                <a:avLst/>
+              </a:prstGeom>
+              <a:gradFill>
+                <a:gsLst>
+                  <a:gs pos="0">
+                    <a:schemeClr val="accent1">
+                      <a:lumMod val="5000"/>
+                      <a:lumOff val="95000"/>
+                    </a:schemeClr>
+                  </a:gs>
                   <a:gs pos="100000">
                     <a:schemeClr val="bg2">
                       <a:lumMod val="50000"/>
                     </a:schemeClr>
                   </a:gs>
+                  <a:gs pos="82000">
+                    <a:schemeClr val="bg2">
+                      <a:lumMod val="50000"/>
+                    </a:schemeClr>
+                  </a:gs>
+                  <a:gs pos="54000">
+                    <a:schemeClr val="bg2">
+                      <a:lumMod val="75000"/>
+                    </a:schemeClr>
+                  </a:gs>
+                </a:gsLst>
+                <a:path path="circle">
+                  <a:fillToRect l="100000" t="100000"/>
+                </a:path>
+              </a:gradFill>
+              <a:ln w="31750">
+                <a:solidFill>
+                  <a:schemeClr val="tx1"/>
+                </a:solidFill>
+              </a:ln>
+            </p:spPr>
+            <p:style>
+              <a:lnRef idx="2">
+                <a:schemeClr val="accent1">
+                  <a:shade val="50000"/>
+                </a:schemeClr>
+              </a:lnRef>
+              <a:fillRef idx="1">
+                <a:schemeClr val="accent1"/>
+              </a:fillRef>
+              <a:effectRef idx="0">
+                <a:schemeClr val="accent1"/>
+              </a:effectRef>
+              <a:fontRef idx="minor">
+                <a:schemeClr val="lt1"/>
+              </a:fontRef>
+            </p:style>
+            <p:txBody>
+              <a:bodyPr rtlCol="0" anchor="ctr"/>
+              <a:lstStyle/>
+              <a:p>
+                <a:pPr algn="ctr"/>
+                <a:endParaRPr lang="en-CA" dirty="0"/>
+              </a:p>
+            </p:txBody>
+          </p:sp>
+          <p:sp>
+            <p:nvSpPr>
+              <p:cNvPr id="11" name="Rectangle 10">
+                <a:extLst>
+                  <a:ext uri="{FF2B5EF4-FFF2-40B4-BE49-F238E27FC236}">
+                    <a16:creationId xmlns:a16="http://schemas.microsoft.com/office/drawing/2014/main" id="{CE927282-D4D4-401B-8137-A11B88A5A181}"/>
+                  </a:ext>
+                </a:extLst>
+              </p:cNvPr>
+              <p:cNvSpPr>
+                <a:spLocks/>
+              </p:cNvSpPr>
+              <p:nvPr/>
+            </p:nvSpPr>
+            <p:spPr>
+              <a:xfrm rot="18829783">
+                <a:off x="6201571" y="4042525"/>
+                <a:ext cx="176269" cy="271307"/>
+              </a:xfrm>
+              <a:prstGeom prst="rect">
+                <a:avLst/>
+              </a:prstGeom>
+              <a:gradFill flip="none" rotWithShape="1">
+                <a:gsLst>
                   <a:gs pos="0">
-                    <a:srgbClr val="8E8C8C"/>
+                    <a:schemeClr val="bg1">
+                      <a:lumMod val="85000"/>
+                    </a:schemeClr>
                   </a:gs>
-                  <a:gs pos="82000">
+                  <a:gs pos="100000">
+                    <a:schemeClr val="bg2">
+                      <a:lumMod val="50000"/>
+                    </a:schemeClr>
+                  </a:gs>
+                  <a:gs pos="71000">
+                    <a:schemeClr val="bg2">
+                      <a:lumMod val="50000"/>
+                    </a:schemeClr>
+                  </a:gs>
+                  <a:gs pos="20000">
                     <a:schemeClr val="bg1">
                       <a:lumMod val="65000"/>
                     </a:schemeClr>
                   </a:gs>
-                  <a:gs pos="25000">
-                    <a:srgbClr val="C5C5C5"/>
-                  </a:gs>
-                  <a:gs pos="45000">
-                    <a:schemeClr val="bg1">
-                      <a:lumMod val="95000"/>
-                    </a:schemeClr>
-                  </a:gs>
                 </a:gsLst>
-                <a:lin ang="5400000" scaled="0"/>
+                <a:lin ang="0" scaled="0"/>
                 <a:tileRect/>
               </a:gradFill>
               <a:ln>
@@ -8354,88 +7497,267 @@
               </a:p>
             </p:txBody>
           </p:sp>
-          <p:sp>
-            <p:nvSpPr>
-              <p:cNvPr id="21" name="Flowchart: Manual Operation 20">
+          <p:grpSp>
+            <p:nvGrpSpPr>
+              <p:cNvPr id="14" name="Group 13">
                 <a:extLst>
                   <a:ext uri="{FF2B5EF4-FFF2-40B4-BE49-F238E27FC236}">
-                    <a16:creationId xmlns:a16="http://schemas.microsoft.com/office/drawing/2014/main" id="{B92E15B6-9DDE-4D40-9D7C-CF0478A3EC7F}"/>
+                    <a16:creationId xmlns:a16="http://schemas.microsoft.com/office/drawing/2014/main" id="{2A512D90-22D3-450C-B8C0-FCF7428C4A81}"/>
                   </a:ext>
                 </a:extLst>
               </p:cNvPr>
-              <p:cNvSpPr/>
+              <p:cNvGrpSpPr/>
+              <p:nvPr/>
+            </p:nvGrpSpPr>
+            <p:grpSpPr>
+              <a:xfrm>
+                <a:off x="5970976" y="3937517"/>
+                <a:ext cx="406329" cy="241842"/>
+                <a:chOff x="5471532" y="2491845"/>
+                <a:chExt cx="406329" cy="241842"/>
+              </a:xfrm>
+            </p:grpSpPr>
+            <p:sp>
+              <p:nvSpPr>
+                <p:cNvPr id="20" name="Rectangle: Rounded Corners 19">
+                  <a:extLst>
+                    <a:ext uri="{FF2B5EF4-FFF2-40B4-BE49-F238E27FC236}">
+                      <a16:creationId xmlns:a16="http://schemas.microsoft.com/office/drawing/2014/main" id="{B78B4723-805D-4112-B441-D35D4AA5EA31}"/>
+                    </a:ext>
+                  </a:extLst>
+                </p:cNvPr>
+                <p:cNvSpPr/>
+                <p:nvPr/>
+              </p:nvSpPr>
+              <p:spPr>
+                <a:xfrm rot="2695155" flipH="1">
+                  <a:off x="5471532" y="2491845"/>
+                  <a:ext cx="327882" cy="192416"/>
+                </a:xfrm>
+                <a:prstGeom prst="roundRect">
+                  <a:avLst/>
+                </a:prstGeom>
+                <a:gradFill flip="none" rotWithShape="1">
+                  <a:gsLst>
+                    <a:gs pos="100000">
+                      <a:schemeClr val="bg2">
+                        <a:lumMod val="50000"/>
+                      </a:schemeClr>
+                    </a:gs>
+                    <a:gs pos="0">
+                      <a:srgbClr val="8E8C8C"/>
+                    </a:gs>
+                    <a:gs pos="82000">
+                      <a:schemeClr val="bg1">
+                        <a:lumMod val="65000"/>
+                      </a:schemeClr>
+                    </a:gs>
+                    <a:gs pos="25000">
+                      <a:srgbClr val="C5C5C5"/>
+                    </a:gs>
+                    <a:gs pos="45000">
+                      <a:schemeClr val="bg1">
+                        <a:lumMod val="95000"/>
+                      </a:schemeClr>
+                    </a:gs>
+                  </a:gsLst>
+                  <a:lin ang="5400000" scaled="0"/>
+                  <a:tileRect/>
+                </a:gradFill>
+                <a:ln>
+                  <a:noFill/>
+                </a:ln>
+              </p:spPr>
+              <p:style>
+                <a:lnRef idx="2">
+                  <a:schemeClr val="accent1">
+                    <a:shade val="50000"/>
+                  </a:schemeClr>
+                </a:lnRef>
+                <a:fillRef idx="1">
+                  <a:schemeClr val="accent1"/>
+                </a:fillRef>
+                <a:effectRef idx="0">
+                  <a:schemeClr val="accent1"/>
+                </a:effectRef>
+                <a:fontRef idx="minor">
+                  <a:schemeClr val="lt1"/>
+                </a:fontRef>
+              </p:style>
+              <p:txBody>
+                <a:bodyPr rtlCol="0" anchor="ctr"/>
+                <a:lstStyle/>
+                <a:p>
+                  <a:pPr algn="ctr"/>
+                  <a:endParaRPr lang="en-CA"/>
+                </a:p>
+              </p:txBody>
+            </p:sp>
+            <p:sp>
+              <p:nvSpPr>
+                <p:cNvPr id="21" name="Flowchart: Manual Operation 20">
+                  <a:extLst>
+                    <a:ext uri="{FF2B5EF4-FFF2-40B4-BE49-F238E27FC236}">
+                      <a16:creationId xmlns:a16="http://schemas.microsoft.com/office/drawing/2014/main" id="{B92E15B6-9DDE-4D40-9D7C-CF0478A3EC7F}"/>
+                    </a:ext>
+                  </a:extLst>
+                </p:cNvPr>
+                <p:cNvSpPr/>
+                <p:nvPr/>
+              </p:nvSpPr>
+              <p:spPr>
+                <a:xfrm rot="8107936">
+                  <a:off x="5569014" y="2612690"/>
+                  <a:ext cx="308847" cy="120997"/>
+                </a:xfrm>
+                <a:prstGeom prst="flowChartManualOperation">
+                  <a:avLst/>
+                </a:prstGeom>
+                <a:gradFill>
+                  <a:gsLst>
+                    <a:gs pos="100000">
+                      <a:schemeClr val="bg2">
+                        <a:lumMod val="50000"/>
+                      </a:schemeClr>
+                    </a:gs>
+                    <a:gs pos="0">
+                      <a:srgbClr val="8E8C8C"/>
+                    </a:gs>
+                    <a:gs pos="82000">
+                      <a:schemeClr val="bg1">
+                        <a:lumMod val="65000"/>
+                      </a:schemeClr>
+                    </a:gs>
+                    <a:gs pos="25000">
+                      <a:srgbClr val="C5C5C5"/>
+                    </a:gs>
+                    <a:gs pos="45000">
+                      <a:schemeClr val="bg1">
+                        <a:lumMod val="95000"/>
+                      </a:schemeClr>
+                    </a:gs>
+                  </a:gsLst>
+                  <a:lin ang="0" scaled="0"/>
+                </a:gradFill>
+                <a:ln>
+                  <a:noFill/>
+                </a:ln>
+              </p:spPr>
+              <p:style>
+                <a:lnRef idx="2">
+                  <a:schemeClr val="accent1">
+                    <a:shade val="50000"/>
+                  </a:schemeClr>
+                </a:lnRef>
+                <a:fillRef idx="1">
+                  <a:schemeClr val="accent1"/>
+                </a:fillRef>
+                <a:effectRef idx="0">
+                  <a:schemeClr val="accent1"/>
+                </a:effectRef>
+                <a:fontRef idx="minor">
+                  <a:schemeClr val="lt1"/>
+                </a:fontRef>
+              </p:style>
+              <p:txBody>
+                <a:bodyPr rtlCol="0" anchor="ctr"/>
+                <a:lstStyle/>
+                <a:p>
+                  <a:pPr algn="ctr"/>
+                  <a:endParaRPr lang="en-CA"/>
+                </a:p>
+              </p:txBody>
+            </p:sp>
+          </p:grpSp>
+          <p:sp>
+            <p:nvSpPr>
+              <p:cNvPr id="16" name="TextBox 15">
+                <a:extLst>
+                  <a:ext uri="{FF2B5EF4-FFF2-40B4-BE49-F238E27FC236}">
+                    <a16:creationId xmlns:a16="http://schemas.microsoft.com/office/drawing/2014/main" id="{8AB1BE96-F055-481E-9277-BB5089FDBB62}"/>
+                  </a:ext>
+                </a:extLst>
+              </p:cNvPr>
+              <p:cNvSpPr txBox="1"/>
               <p:nvPr/>
             </p:nvSpPr>
             <p:spPr>
-              <a:xfrm rot="8107936">
-                <a:off x="5569014" y="2612690"/>
-                <a:ext cx="308847" cy="120997"/>
+              <a:xfrm>
+                <a:off x="5845100" y="1827817"/>
+                <a:ext cx="887030" cy="307777"/>
               </a:xfrm>
-              <a:prstGeom prst="flowChartManualOperation">
+              <a:prstGeom prst="rect">
                 <a:avLst/>
               </a:prstGeom>
-              <a:gradFill>
-                <a:gsLst>
-                  <a:gs pos="100000">
-                    <a:schemeClr val="bg2">
-                      <a:lumMod val="50000"/>
-                    </a:schemeClr>
-                  </a:gs>
-                  <a:gs pos="0">
-                    <a:srgbClr val="8E8C8C"/>
-                  </a:gs>
-                  <a:gs pos="82000">
-                    <a:schemeClr val="bg1">
-                      <a:lumMod val="65000"/>
-                    </a:schemeClr>
-                  </a:gs>
-                  <a:gs pos="25000">
-                    <a:srgbClr val="C5C5C5"/>
-                  </a:gs>
-                  <a:gs pos="45000">
-                    <a:schemeClr val="bg1">
-                      <a:lumMod val="95000"/>
-                    </a:schemeClr>
-                  </a:gs>
-                </a:gsLst>
-                <a:lin ang="0" scaled="0"/>
-              </a:gradFill>
-              <a:ln>
-                <a:noFill/>
-              </a:ln>
+              <a:noFill/>
             </p:spPr>
-            <p:style>
-              <a:lnRef idx="2">
-                <a:schemeClr val="accent1">
-                  <a:shade val="50000"/>
-                </a:schemeClr>
-              </a:lnRef>
-              <a:fillRef idx="1">
-                <a:schemeClr val="accent1"/>
-              </a:fillRef>
-              <a:effectRef idx="0">
-                <a:schemeClr val="accent1"/>
-              </a:effectRef>
-              <a:fontRef idx="minor">
-                <a:schemeClr val="lt1"/>
-              </a:fontRef>
-            </p:style>
             <p:txBody>
-              <a:bodyPr rtlCol="0" anchor="ctr"/>
+              <a:bodyPr wrap="square" rtlCol="0">
+                <a:spAutoFit/>
+              </a:bodyPr>
               <a:lstStyle/>
               <a:p>
-                <a:pPr algn="ctr"/>
-                <a:endParaRPr lang="en-CA"/>
+                <a:r>
+                  <a:rPr lang="en-CA" sz="1400" b="1" dirty="0">
+                    <a:latin typeface="Arial" panose="020B0604020202020204" pitchFamily="34" charset="0"/>
+                    <a:cs typeface="Arial" panose="020B0604020202020204" pitchFamily="34" charset="0"/>
+                  </a:rPr>
+                  <a:t>Cochlea</a:t>
+                </a:r>
               </a:p>
             </p:txBody>
           </p:sp>
         </p:grpSp>
+        <p:cxnSp>
+          <p:nvCxnSpPr>
+            <p:cNvPr id="18" name="Straight Arrow Connector 17">
+              <a:extLst>
+                <a:ext uri="{FF2B5EF4-FFF2-40B4-BE49-F238E27FC236}">
+                  <a16:creationId xmlns:a16="http://schemas.microsoft.com/office/drawing/2014/main" id="{3BC93CDC-78D4-1643-B1F6-722C768A49FD}"/>
+                </a:ext>
+              </a:extLst>
+            </p:cNvPr>
+            <p:cNvCxnSpPr>
+              <a:cxnSpLocks/>
+            </p:cNvCxnSpPr>
+            <p:nvPr/>
+          </p:nvCxnSpPr>
+          <p:spPr>
+            <a:xfrm flipV="1">
+              <a:off x="5928223" y="4292727"/>
+              <a:ext cx="159632" cy="376760"/>
+            </a:xfrm>
+            <a:prstGeom prst="straightConnector1">
+              <a:avLst/>
+            </a:prstGeom>
+            <a:ln w="28575">
+              <a:solidFill>
+                <a:schemeClr val="tx1"/>
+              </a:solidFill>
+              <a:tailEnd type="triangle" w="med" len="lg"/>
+            </a:ln>
+          </p:spPr>
+          <p:style>
+            <a:lnRef idx="1">
+              <a:schemeClr val="accent1"/>
+            </a:lnRef>
+            <a:fillRef idx="0">
+              <a:schemeClr val="accent1"/>
+            </a:fillRef>
+            <a:effectRef idx="0">
+              <a:schemeClr val="accent1"/>
+            </a:effectRef>
+            <a:fontRef idx="minor">
+              <a:schemeClr val="tx1"/>
+            </a:fontRef>
+          </p:style>
+        </p:cxnSp>
         <p:sp>
           <p:nvSpPr>
-            <p:cNvPr id="15" name="TextBox 14">
+            <p:cNvPr id="19" name="TextBox 18">
               <a:extLst>
                 <a:ext uri="{FF2B5EF4-FFF2-40B4-BE49-F238E27FC236}">
-                  <a16:creationId xmlns:a16="http://schemas.microsoft.com/office/drawing/2014/main" id="{1878E920-3F35-44E7-A2AA-E56B8793264F}"/>
+                  <a16:creationId xmlns:a16="http://schemas.microsoft.com/office/drawing/2014/main" id="{A3C24F30-3B2F-7049-B9BD-ADE4C1038EE6}"/>
                 </a:ext>
               </a:extLst>
             </p:cNvPr>
@@ -8444,8 +7766,8 @@
           </p:nvSpPr>
           <p:spPr>
             <a:xfrm>
-              <a:off x="4240238" y="3948805"/>
-              <a:ext cx="1463877" cy="292388"/>
+              <a:off x="5658618" y="4611666"/>
+              <a:ext cx="1709500" cy="307777"/>
             </a:xfrm>
             <a:prstGeom prst="rect">
               <a:avLst/>
@@ -8459,97 +7781,15 @@
             <a:lstStyle/>
             <a:p>
               <a:r>
-                <a:rPr lang="en-CA" sz="1300" dirty="0">
+                <a:rPr lang="en-CA" sz="1400" b="1" dirty="0">
                   <a:latin typeface="Arial" panose="020B0604020202020204" pitchFamily="34" charset="0"/>
                   <a:cs typeface="Arial" panose="020B0604020202020204" pitchFamily="34" charset="0"/>
                 </a:rPr>
-                <a:t>Cochlear implant</a:t>
+                <a:t>RWN</a:t>
               </a:r>
             </a:p>
           </p:txBody>
         </p:sp>
-        <p:sp>
-          <p:nvSpPr>
-            <p:cNvPr id="16" name="TextBox 15">
-              <a:extLst>
-                <a:ext uri="{FF2B5EF4-FFF2-40B4-BE49-F238E27FC236}">
-                  <a16:creationId xmlns:a16="http://schemas.microsoft.com/office/drawing/2014/main" id="{8AB1BE96-F055-481E-9277-BB5089FDBB62}"/>
-                </a:ext>
-              </a:extLst>
-            </p:cNvPr>
-            <p:cNvSpPr txBox="1"/>
-            <p:nvPr/>
-          </p:nvSpPr>
-          <p:spPr>
-            <a:xfrm>
-              <a:off x="5845100" y="1827817"/>
-              <a:ext cx="807438" cy="292388"/>
-            </a:xfrm>
-            <a:prstGeom prst="rect">
-              <a:avLst/>
-            </a:prstGeom>
-            <a:noFill/>
-          </p:spPr>
-          <p:txBody>
-            <a:bodyPr wrap="square" rtlCol="0">
-              <a:spAutoFit/>
-            </a:bodyPr>
-            <a:lstStyle/>
-            <a:p>
-              <a:r>
-                <a:rPr lang="en-CA" sz="1300" dirty="0">
-                  <a:latin typeface="Arial" panose="020B0604020202020204" pitchFamily="34" charset="0"/>
-                  <a:cs typeface="Arial" panose="020B0604020202020204" pitchFamily="34" charset="0"/>
-                </a:rPr>
-                <a:t>Cochlea</a:t>
-              </a:r>
-            </a:p>
-          </p:txBody>
-        </p:sp>
-        <p:cxnSp>
-          <p:nvCxnSpPr>
-            <p:cNvPr id="22" name="Straight Arrow Connector 21">
-              <a:extLst>
-                <a:ext uri="{FF2B5EF4-FFF2-40B4-BE49-F238E27FC236}">
-                  <a16:creationId xmlns:a16="http://schemas.microsoft.com/office/drawing/2014/main" id="{A08B1902-088F-4701-880A-5DD7DE00DDAE}"/>
-                </a:ext>
-              </a:extLst>
-            </p:cNvPr>
-            <p:cNvCxnSpPr>
-              <a:cxnSpLocks/>
-            </p:cNvCxnSpPr>
-            <p:nvPr/>
-          </p:nvCxnSpPr>
-          <p:spPr>
-            <a:xfrm flipV="1">
-              <a:off x="5638952" y="4013479"/>
-              <a:ext cx="418265" cy="81520"/>
-            </a:xfrm>
-            <a:prstGeom prst="straightConnector1">
-              <a:avLst/>
-            </a:prstGeom>
-            <a:ln w="12700">
-              <a:solidFill>
-                <a:schemeClr val="tx1"/>
-              </a:solidFill>
-              <a:tailEnd type="triangle" w="med" len="lg"/>
-            </a:ln>
-          </p:spPr>
-          <p:style>
-            <a:lnRef idx="1">
-              <a:schemeClr val="accent1"/>
-            </a:lnRef>
-            <a:fillRef idx="0">
-              <a:schemeClr val="accent1"/>
-            </a:fillRef>
-            <a:effectRef idx="0">
-              <a:schemeClr val="accent1"/>
-            </a:effectRef>
-            <a:fontRef idx="minor">
-              <a:schemeClr val="tx1"/>
-            </a:fontRef>
-          </p:style>
-        </p:cxnSp>
       </p:grpSp>
     </p:spTree>
     <p:extLst>

</xml_diff>